<commit_message>
Updates from RNL lab meet. v1.
</commit_message>
<xml_diff>
--- a/analysis/submitted_analyses/additional_fixation_properties.pptx
+++ b/analysis/submitted_analyses/additional_fixation_properties.pptx
@@ -2,12 +2,12 @@
 <file path=ppt/presentation.xml><?xml version="1.0" encoding="utf-8"?>
 <p:presentation xmlns:a="http://schemas.openxmlformats.org/drawingml/2006/main" xmlns:r="http://schemas.openxmlformats.org/officeDocument/2006/relationships" xmlns:p="http://schemas.openxmlformats.org/presentationml/2006/main" saveSubsetFonts="1" autoCompressPictures="0">
   <p:sldMasterIdLst>
-    <p:sldMasterId id="2147483660" r:id="rId1"/>
+    <p:sldMasterId id="2147483672" r:id="rId1"/>
   </p:sldMasterIdLst>
   <p:sldIdLst>
     <p:sldId id="257" r:id="rId2"/>
   </p:sldIdLst>
-  <p:sldSz cx="5486400" cy="10972800"/>
+  <p:sldSz cx="5486400" cy="14630400"/>
   <p:notesSz cx="6858000" cy="9144000"/>
   <p:defaultTextStyle>
     <a:defPPr>
@@ -141,8 +141,8 @@
         </p:nvSpPr>
         <p:spPr>
           <a:xfrm>
-            <a:off x="411480" y="1795781"/>
-            <a:ext cx="4663440" cy="3820160"/>
+            <a:off x="411480" y="2394374"/>
+            <a:ext cx="4663440" cy="5093547"/>
           </a:xfrm>
         </p:spPr>
         <p:txBody>
@@ -173,8 +173,8 @@
         </p:nvSpPr>
         <p:spPr>
           <a:xfrm>
-            <a:off x="685800" y="5763261"/>
-            <a:ext cx="4114800" cy="2649219"/>
+            <a:off x="685800" y="7684348"/>
+            <a:ext cx="4114800" cy="3532292"/>
           </a:xfrm>
         </p:spPr>
         <p:txBody>
@@ -243,7 +243,7 @@
           <a:p>
             <a:fld id="{CFC60B5F-2253-DF41-8690-61B53F1555CE}" type="datetimeFigureOut">
               <a:rPr lang="en-US" smtClean="0"/>
-              <a:t>1/30/24</a:t>
+              <a:t>4/19/24</a:t>
             </a:fld>
             <a:endParaRPr lang="en-US"/>
           </a:p>
@@ -294,7 +294,7 @@
     </p:spTree>
     <p:extLst>
       <p:ext uri="{BB962C8B-B14F-4D97-AF65-F5344CB8AC3E}">
-        <p14:creationId xmlns:p14="http://schemas.microsoft.com/office/powerpoint/2010/main" val="2333743379"/>
+        <p14:creationId xmlns:p14="http://schemas.microsoft.com/office/powerpoint/2010/main" val="3749677186"/>
       </p:ext>
     </p:extLst>
   </p:cSld>
@@ -413,7 +413,7 @@
           <a:p>
             <a:fld id="{CFC60B5F-2253-DF41-8690-61B53F1555CE}" type="datetimeFigureOut">
               <a:rPr lang="en-US" smtClean="0"/>
-              <a:t>1/30/24</a:t>
+              <a:t>4/19/24</a:t>
             </a:fld>
             <a:endParaRPr lang="en-US"/>
           </a:p>
@@ -464,7 +464,7 @@
     </p:spTree>
     <p:extLst>
       <p:ext uri="{BB962C8B-B14F-4D97-AF65-F5344CB8AC3E}">
-        <p14:creationId xmlns:p14="http://schemas.microsoft.com/office/powerpoint/2010/main" val="2510696380"/>
+        <p14:creationId xmlns:p14="http://schemas.microsoft.com/office/powerpoint/2010/main" val="173648040"/>
       </p:ext>
     </p:extLst>
   </p:cSld>
@@ -503,8 +503,8 @@
         </p:nvSpPr>
         <p:spPr>
           <a:xfrm>
-            <a:off x="3926205" y="584200"/>
-            <a:ext cx="1183005" cy="9298941"/>
+            <a:off x="3926205" y="778933"/>
+            <a:ext cx="1183005" cy="12398588"/>
           </a:xfrm>
         </p:spPr>
         <p:txBody>
@@ -531,8 +531,8 @@
         </p:nvSpPr>
         <p:spPr>
           <a:xfrm>
-            <a:off x="377190" y="584200"/>
-            <a:ext cx="3480435" cy="9298941"/>
+            <a:off x="377190" y="778933"/>
+            <a:ext cx="3480435" cy="12398588"/>
           </a:xfrm>
         </p:spPr>
         <p:txBody>
@@ -593,7 +593,7 @@
           <a:p>
             <a:fld id="{CFC60B5F-2253-DF41-8690-61B53F1555CE}" type="datetimeFigureOut">
               <a:rPr lang="en-US" smtClean="0"/>
-              <a:t>1/30/24</a:t>
+              <a:t>4/19/24</a:t>
             </a:fld>
             <a:endParaRPr lang="en-US"/>
           </a:p>
@@ -644,7 +644,7 @@
     </p:spTree>
     <p:extLst>
       <p:ext uri="{BB962C8B-B14F-4D97-AF65-F5344CB8AC3E}">
-        <p14:creationId xmlns:p14="http://schemas.microsoft.com/office/powerpoint/2010/main" val="1203120749"/>
+        <p14:creationId xmlns:p14="http://schemas.microsoft.com/office/powerpoint/2010/main" val="3755037872"/>
       </p:ext>
     </p:extLst>
   </p:cSld>
@@ -763,7 +763,7 @@
           <a:p>
             <a:fld id="{CFC60B5F-2253-DF41-8690-61B53F1555CE}" type="datetimeFigureOut">
               <a:rPr lang="en-US" smtClean="0"/>
-              <a:t>1/30/24</a:t>
+              <a:t>4/19/24</a:t>
             </a:fld>
             <a:endParaRPr lang="en-US"/>
           </a:p>
@@ -814,7 +814,7 @@
     </p:spTree>
     <p:extLst>
       <p:ext uri="{BB962C8B-B14F-4D97-AF65-F5344CB8AC3E}">
-        <p14:creationId xmlns:p14="http://schemas.microsoft.com/office/powerpoint/2010/main" val="971966117"/>
+        <p14:creationId xmlns:p14="http://schemas.microsoft.com/office/powerpoint/2010/main" val="3823264418"/>
       </p:ext>
     </p:extLst>
   </p:cSld>
@@ -853,8 +853,8 @@
         </p:nvSpPr>
         <p:spPr>
           <a:xfrm>
-            <a:off x="374333" y="2735583"/>
-            <a:ext cx="4732020" cy="4564379"/>
+            <a:off x="374333" y="3647444"/>
+            <a:ext cx="4732020" cy="6085839"/>
           </a:xfrm>
         </p:spPr>
         <p:txBody>
@@ -885,8 +885,8 @@
         </p:nvSpPr>
         <p:spPr>
           <a:xfrm>
-            <a:off x="374333" y="7343143"/>
-            <a:ext cx="4732020" cy="2400299"/>
+            <a:off x="374333" y="9790858"/>
+            <a:ext cx="4732020" cy="3200399"/>
           </a:xfrm>
         </p:spPr>
         <p:txBody>
@@ -1007,7 +1007,7 @@
           <a:p>
             <a:fld id="{CFC60B5F-2253-DF41-8690-61B53F1555CE}" type="datetimeFigureOut">
               <a:rPr lang="en-US" smtClean="0"/>
-              <a:t>1/30/24</a:t>
+              <a:t>4/19/24</a:t>
             </a:fld>
             <a:endParaRPr lang="en-US"/>
           </a:p>
@@ -1058,7 +1058,7 @@
     </p:spTree>
     <p:extLst>
       <p:ext uri="{BB962C8B-B14F-4D97-AF65-F5344CB8AC3E}">
-        <p14:creationId xmlns:p14="http://schemas.microsoft.com/office/powerpoint/2010/main" val="3354559015"/>
+        <p14:creationId xmlns:p14="http://schemas.microsoft.com/office/powerpoint/2010/main" val="169823208"/>
       </p:ext>
     </p:extLst>
   </p:cSld>
@@ -1120,8 +1120,8 @@
         </p:nvSpPr>
         <p:spPr>
           <a:xfrm>
-            <a:off x="377190" y="2921000"/>
-            <a:ext cx="2331720" cy="6962141"/>
+            <a:off x="377190" y="3894667"/>
+            <a:ext cx="2331720" cy="9282854"/>
           </a:xfrm>
         </p:spPr>
         <p:txBody>
@@ -1177,8 +1177,8 @@
         </p:nvSpPr>
         <p:spPr>
           <a:xfrm>
-            <a:off x="2777490" y="2921000"/>
-            <a:ext cx="2331720" cy="6962141"/>
+            <a:off x="2777490" y="3894667"/>
+            <a:ext cx="2331720" cy="9282854"/>
           </a:xfrm>
         </p:spPr>
         <p:txBody>
@@ -1239,7 +1239,7 @@
           <a:p>
             <a:fld id="{CFC60B5F-2253-DF41-8690-61B53F1555CE}" type="datetimeFigureOut">
               <a:rPr lang="en-US" smtClean="0"/>
-              <a:t>1/30/24</a:t>
+              <a:t>4/19/24</a:t>
             </a:fld>
             <a:endParaRPr lang="en-US"/>
           </a:p>
@@ -1290,7 +1290,7 @@
     </p:spTree>
     <p:extLst>
       <p:ext uri="{BB962C8B-B14F-4D97-AF65-F5344CB8AC3E}">
-        <p14:creationId xmlns:p14="http://schemas.microsoft.com/office/powerpoint/2010/main" val="1391485984"/>
+        <p14:creationId xmlns:p14="http://schemas.microsoft.com/office/powerpoint/2010/main" val="238549254"/>
       </p:ext>
     </p:extLst>
   </p:cSld>
@@ -1329,8 +1329,8 @@
         </p:nvSpPr>
         <p:spPr>
           <a:xfrm>
-            <a:off x="377905" y="584202"/>
-            <a:ext cx="4732020" cy="2120901"/>
+            <a:off x="377905" y="778936"/>
+            <a:ext cx="4732020" cy="2827868"/>
           </a:xfrm>
         </p:spPr>
         <p:txBody>
@@ -1357,8 +1357,8 @@
         </p:nvSpPr>
         <p:spPr>
           <a:xfrm>
-            <a:off x="377905" y="2689861"/>
-            <a:ext cx="2321004" cy="1318259"/>
+            <a:off x="377905" y="3586481"/>
+            <a:ext cx="2321004" cy="1757679"/>
           </a:xfrm>
         </p:spPr>
         <p:txBody>
@@ -1422,8 +1422,8 @@
         </p:nvSpPr>
         <p:spPr>
           <a:xfrm>
-            <a:off x="377905" y="4008120"/>
-            <a:ext cx="2321004" cy="5895341"/>
+            <a:off x="377905" y="5344160"/>
+            <a:ext cx="2321004" cy="7860454"/>
           </a:xfrm>
         </p:spPr>
         <p:txBody>
@@ -1479,8 +1479,8 @@
         </p:nvSpPr>
         <p:spPr>
           <a:xfrm>
-            <a:off x="2777490" y="2689861"/>
-            <a:ext cx="2332435" cy="1318259"/>
+            <a:off x="2777490" y="3586481"/>
+            <a:ext cx="2332435" cy="1757679"/>
           </a:xfrm>
         </p:spPr>
         <p:txBody>
@@ -1544,8 +1544,8 @@
         </p:nvSpPr>
         <p:spPr>
           <a:xfrm>
-            <a:off x="2777490" y="4008120"/>
-            <a:ext cx="2332435" cy="5895341"/>
+            <a:off x="2777490" y="5344160"/>
+            <a:ext cx="2332435" cy="7860454"/>
           </a:xfrm>
         </p:spPr>
         <p:txBody>
@@ -1606,7 +1606,7 @@
           <a:p>
             <a:fld id="{CFC60B5F-2253-DF41-8690-61B53F1555CE}" type="datetimeFigureOut">
               <a:rPr lang="en-US" smtClean="0"/>
-              <a:t>1/30/24</a:t>
+              <a:t>4/19/24</a:t>
             </a:fld>
             <a:endParaRPr lang="en-US"/>
           </a:p>
@@ -1657,7 +1657,7 @@
     </p:spTree>
     <p:extLst>
       <p:ext uri="{BB962C8B-B14F-4D97-AF65-F5344CB8AC3E}">
-        <p14:creationId xmlns:p14="http://schemas.microsoft.com/office/powerpoint/2010/main" val="189144510"/>
+        <p14:creationId xmlns:p14="http://schemas.microsoft.com/office/powerpoint/2010/main" val="1537999887"/>
       </p:ext>
     </p:extLst>
   </p:cSld>
@@ -1724,7 +1724,7 @@
           <a:p>
             <a:fld id="{CFC60B5F-2253-DF41-8690-61B53F1555CE}" type="datetimeFigureOut">
               <a:rPr lang="en-US" smtClean="0"/>
-              <a:t>1/30/24</a:t>
+              <a:t>4/19/24</a:t>
             </a:fld>
             <a:endParaRPr lang="en-US"/>
           </a:p>
@@ -1775,7 +1775,7 @@
     </p:spTree>
     <p:extLst>
       <p:ext uri="{BB962C8B-B14F-4D97-AF65-F5344CB8AC3E}">
-        <p14:creationId xmlns:p14="http://schemas.microsoft.com/office/powerpoint/2010/main" val="1562713241"/>
+        <p14:creationId xmlns:p14="http://schemas.microsoft.com/office/powerpoint/2010/main" val="2001575313"/>
       </p:ext>
     </p:extLst>
   </p:cSld>
@@ -1819,7 +1819,7 @@
           <a:p>
             <a:fld id="{CFC60B5F-2253-DF41-8690-61B53F1555CE}" type="datetimeFigureOut">
               <a:rPr lang="en-US" smtClean="0"/>
-              <a:t>1/30/24</a:t>
+              <a:t>4/19/24</a:t>
             </a:fld>
             <a:endParaRPr lang="en-US"/>
           </a:p>
@@ -1870,7 +1870,7 @@
     </p:spTree>
     <p:extLst>
       <p:ext uri="{BB962C8B-B14F-4D97-AF65-F5344CB8AC3E}">
-        <p14:creationId xmlns:p14="http://schemas.microsoft.com/office/powerpoint/2010/main" val="138722453"/>
+        <p14:creationId xmlns:p14="http://schemas.microsoft.com/office/powerpoint/2010/main" val="2501549114"/>
       </p:ext>
     </p:extLst>
   </p:cSld>
@@ -1909,8 +1909,8 @@
         </p:nvSpPr>
         <p:spPr>
           <a:xfrm>
-            <a:off x="377905" y="731520"/>
-            <a:ext cx="1769507" cy="2560320"/>
+            <a:off x="377905" y="975360"/>
+            <a:ext cx="1769507" cy="3413760"/>
           </a:xfrm>
         </p:spPr>
         <p:txBody>
@@ -1941,8 +1941,8 @@
         </p:nvSpPr>
         <p:spPr>
           <a:xfrm>
-            <a:off x="2332435" y="1579882"/>
-            <a:ext cx="2777490" cy="7797800"/>
+            <a:off x="2332435" y="2106510"/>
+            <a:ext cx="2777490" cy="10397067"/>
           </a:xfrm>
         </p:spPr>
         <p:txBody>
@@ -2026,8 +2026,8 @@
         </p:nvSpPr>
         <p:spPr>
           <a:xfrm>
-            <a:off x="377905" y="3291840"/>
-            <a:ext cx="1769507" cy="6098541"/>
+            <a:off x="377905" y="4389120"/>
+            <a:ext cx="1769507" cy="8131388"/>
           </a:xfrm>
         </p:spPr>
         <p:txBody>
@@ -2096,7 +2096,7 @@
           <a:p>
             <a:fld id="{CFC60B5F-2253-DF41-8690-61B53F1555CE}" type="datetimeFigureOut">
               <a:rPr lang="en-US" smtClean="0"/>
-              <a:t>1/30/24</a:t>
+              <a:t>4/19/24</a:t>
             </a:fld>
             <a:endParaRPr lang="en-US"/>
           </a:p>
@@ -2147,7 +2147,7 @@
     </p:spTree>
     <p:extLst>
       <p:ext uri="{BB962C8B-B14F-4D97-AF65-F5344CB8AC3E}">
-        <p14:creationId xmlns:p14="http://schemas.microsoft.com/office/powerpoint/2010/main" val="2525238704"/>
+        <p14:creationId xmlns:p14="http://schemas.microsoft.com/office/powerpoint/2010/main" val="4289702480"/>
       </p:ext>
     </p:extLst>
   </p:cSld>
@@ -2186,8 +2186,8 @@
         </p:nvSpPr>
         <p:spPr>
           <a:xfrm>
-            <a:off x="377905" y="731520"/>
-            <a:ext cx="1769507" cy="2560320"/>
+            <a:off x="377905" y="975360"/>
+            <a:ext cx="1769507" cy="3413760"/>
           </a:xfrm>
         </p:spPr>
         <p:txBody>
@@ -2218,8 +2218,8 @@
         </p:nvSpPr>
         <p:spPr>
           <a:xfrm>
-            <a:off x="2332435" y="1579882"/>
-            <a:ext cx="2777490" cy="7797800"/>
+            <a:off x="2332435" y="2106510"/>
+            <a:ext cx="2777490" cy="10397067"/>
           </a:xfrm>
         </p:spPr>
         <p:txBody>
@@ -2283,8 +2283,8 @@
         </p:nvSpPr>
         <p:spPr>
           <a:xfrm>
-            <a:off x="377905" y="3291840"/>
-            <a:ext cx="1769507" cy="6098541"/>
+            <a:off x="377905" y="4389120"/>
+            <a:ext cx="1769507" cy="8131388"/>
           </a:xfrm>
         </p:spPr>
         <p:txBody>
@@ -2353,7 +2353,7 @@
           <a:p>
             <a:fld id="{CFC60B5F-2253-DF41-8690-61B53F1555CE}" type="datetimeFigureOut">
               <a:rPr lang="en-US" smtClean="0"/>
-              <a:t>1/30/24</a:t>
+              <a:t>4/19/24</a:t>
             </a:fld>
             <a:endParaRPr lang="en-US"/>
           </a:p>
@@ -2404,7 +2404,7 @@
     </p:spTree>
     <p:extLst>
       <p:ext uri="{BB962C8B-B14F-4D97-AF65-F5344CB8AC3E}">
-        <p14:creationId xmlns:p14="http://schemas.microsoft.com/office/powerpoint/2010/main" val="1607144728"/>
+        <p14:creationId xmlns:p14="http://schemas.microsoft.com/office/powerpoint/2010/main" val="937491941"/>
       </p:ext>
     </p:extLst>
   </p:cSld>
@@ -2448,8 +2448,8 @@
         </p:nvSpPr>
         <p:spPr>
           <a:xfrm>
-            <a:off x="377190" y="584202"/>
-            <a:ext cx="4732020" cy="2120901"/>
+            <a:off x="377190" y="778936"/>
+            <a:ext cx="4732020" cy="2827868"/>
           </a:xfrm>
           <a:prstGeom prst="rect">
             <a:avLst/>
@@ -2481,8 +2481,8 @@
         </p:nvSpPr>
         <p:spPr>
           <a:xfrm>
-            <a:off x="377190" y="2921000"/>
-            <a:ext cx="4732020" cy="6962141"/>
+            <a:off x="377190" y="3894667"/>
+            <a:ext cx="4732020" cy="9282854"/>
           </a:xfrm>
           <a:prstGeom prst="rect">
             <a:avLst/>
@@ -2543,8 +2543,8 @@
         </p:nvSpPr>
         <p:spPr>
           <a:xfrm>
-            <a:off x="377190" y="10170162"/>
-            <a:ext cx="1234440" cy="584200"/>
+            <a:off x="377190" y="13560217"/>
+            <a:ext cx="1234440" cy="778933"/>
           </a:xfrm>
           <a:prstGeom prst="rect">
             <a:avLst/>
@@ -2566,7 +2566,7 @@
           <a:p>
             <a:fld id="{CFC60B5F-2253-DF41-8690-61B53F1555CE}" type="datetimeFigureOut">
               <a:rPr lang="en-US" smtClean="0"/>
-              <a:t>1/30/24</a:t>
+              <a:t>4/19/24</a:t>
             </a:fld>
             <a:endParaRPr lang="en-US"/>
           </a:p>
@@ -2584,8 +2584,8 @@
         </p:nvSpPr>
         <p:spPr>
           <a:xfrm>
-            <a:off x="1817370" y="10170162"/>
-            <a:ext cx="1851660" cy="584200"/>
+            <a:off x="1817370" y="13560217"/>
+            <a:ext cx="1851660" cy="778933"/>
           </a:xfrm>
           <a:prstGeom prst="rect">
             <a:avLst/>
@@ -2621,8 +2621,8 @@
         </p:nvSpPr>
         <p:spPr>
           <a:xfrm>
-            <a:off x="3874770" y="10170162"/>
-            <a:ext cx="1234440" cy="584200"/>
+            <a:off x="3874770" y="13560217"/>
+            <a:ext cx="1234440" cy="778933"/>
           </a:xfrm>
           <a:prstGeom prst="rect">
             <a:avLst/>
@@ -2653,23 +2653,23 @@
     </p:spTree>
     <p:extLst>
       <p:ext uri="{BB962C8B-B14F-4D97-AF65-F5344CB8AC3E}">
-        <p14:creationId xmlns:p14="http://schemas.microsoft.com/office/powerpoint/2010/main" val="453401717"/>
+        <p14:creationId xmlns:p14="http://schemas.microsoft.com/office/powerpoint/2010/main" val="3828414224"/>
       </p:ext>
     </p:extLst>
   </p:cSld>
   <p:clrMap bg1="lt1" tx1="dk1" bg2="lt2" tx2="dk2" accent1="accent1" accent2="accent2" accent3="accent3" accent4="accent4" accent5="accent5" accent6="accent6" hlink="hlink" folHlink="folHlink"/>
   <p:sldLayoutIdLst>
-    <p:sldLayoutId id="2147483661" r:id="rId1"/>
-    <p:sldLayoutId id="2147483662" r:id="rId2"/>
-    <p:sldLayoutId id="2147483663" r:id="rId3"/>
-    <p:sldLayoutId id="2147483664" r:id="rId4"/>
-    <p:sldLayoutId id="2147483665" r:id="rId5"/>
-    <p:sldLayoutId id="2147483666" r:id="rId6"/>
-    <p:sldLayoutId id="2147483667" r:id="rId7"/>
-    <p:sldLayoutId id="2147483668" r:id="rId8"/>
-    <p:sldLayoutId id="2147483669" r:id="rId9"/>
-    <p:sldLayoutId id="2147483670" r:id="rId10"/>
-    <p:sldLayoutId id="2147483671" r:id="rId11"/>
+    <p:sldLayoutId id="2147483673" r:id="rId1"/>
+    <p:sldLayoutId id="2147483674" r:id="rId2"/>
+    <p:sldLayoutId id="2147483675" r:id="rId3"/>
+    <p:sldLayoutId id="2147483676" r:id="rId4"/>
+    <p:sldLayoutId id="2147483677" r:id="rId5"/>
+    <p:sldLayoutId id="2147483678" r:id="rId6"/>
+    <p:sldLayoutId id="2147483679" r:id="rId7"/>
+    <p:sldLayoutId id="2147483680" r:id="rId8"/>
+    <p:sldLayoutId id="2147483681" r:id="rId9"/>
+    <p:sldLayoutId id="2147483682" r:id="rId10"/>
+    <p:sldLayoutId id="2147483683" r:id="rId11"/>
   </p:sldLayoutIdLst>
   <p:txStyles>
     <p:titleStyle>
@@ -2993,7 +2993,7 @@
         </p:blipFill>
         <p:spPr>
           <a:xfrm>
-            <a:off x="0" y="3657600"/>
+            <a:off x="0" y="7315200"/>
             <a:ext cx="5486400" cy="3657600"/>
           </a:xfrm>
           <a:prstGeom prst="rect">
@@ -3023,7 +3023,7 @@
         </p:blipFill>
         <p:spPr>
           <a:xfrm>
-            <a:off x="0" y="7315200"/>
+            <a:off x="0" y="10972800"/>
             <a:ext cx="5486400" cy="3657600"/>
           </a:xfrm>
           <a:prstGeom prst="rect">
@@ -3054,6 +3054,36 @@
         <p:spPr>
           <a:xfrm>
             <a:off x="0" y="0"/>
+            <a:ext cx="5486400" cy="3657600"/>
+          </a:xfrm>
+          <a:prstGeom prst="rect">
+            <a:avLst/>
+          </a:prstGeom>
+        </p:spPr>
+      </p:pic>
+      <p:pic>
+        <p:nvPicPr>
+          <p:cNvPr id="4" name="Picture 3">
+            <a:extLst>
+              <a:ext uri="{FF2B5EF4-FFF2-40B4-BE49-F238E27FC236}">
+                <a16:creationId xmlns:a16="http://schemas.microsoft.com/office/drawing/2014/main" id="{888A5D06-A704-3454-4A1B-21EDA933E7B1}"/>
+              </a:ext>
+            </a:extLst>
+          </p:cNvPr>
+          <p:cNvPicPr>
+            <a:picLocks noChangeAspect="1"/>
+          </p:cNvPicPr>
+          <p:nvPr/>
+        </p:nvPicPr>
+        <p:blipFill>
+          <a:blip r:embed="rId5"/>
+          <a:stretch>
+            <a:fillRect/>
+          </a:stretch>
+        </p:blipFill>
+        <p:spPr>
+          <a:xfrm>
+            <a:off x="0" y="3657600"/>
             <a:ext cx="5486400" cy="3657600"/>
           </a:xfrm>
           <a:prstGeom prst="rect">

</xml_diff>

<commit_message>
New figures and starting confirmatory work.
</commit_message>
<xml_diff>
--- a/analysis/submitted_analyses/additional_fixation_properties.pptx
+++ b/analysis/submitted_analyses/additional_fixation_properties.pptx
@@ -2,12 +2,12 @@
 <file path=ppt/presentation.xml><?xml version="1.0" encoding="utf-8"?>
 <p:presentation xmlns:a="http://schemas.openxmlformats.org/drawingml/2006/main" xmlns:r="http://schemas.openxmlformats.org/officeDocument/2006/relationships" xmlns:p="http://schemas.openxmlformats.org/presentationml/2006/main" saveSubsetFonts="1" autoCompressPictures="0">
   <p:sldMasterIdLst>
-    <p:sldMasterId id="2147483672" r:id="rId1"/>
+    <p:sldMasterId id="2147483696" r:id="rId1"/>
   </p:sldMasterIdLst>
   <p:sldIdLst>
     <p:sldId id="257" r:id="rId2"/>
   </p:sldIdLst>
-  <p:sldSz cx="5486400" cy="14630400"/>
+  <p:sldSz cx="16459200" cy="15087600"/>
   <p:notesSz cx="6858000" cy="9144000"/>
   <p:defaultTextStyle>
     <a:defPPr>
@@ -141,15 +141,15 @@
         </p:nvSpPr>
         <p:spPr>
           <a:xfrm>
-            <a:off x="411480" y="2394374"/>
-            <a:ext cx="4663440" cy="5093547"/>
+            <a:off x="1234440" y="2469199"/>
+            <a:ext cx="13990320" cy="5252720"/>
           </a:xfrm>
         </p:spPr>
         <p:txBody>
           <a:bodyPr anchor="b"/>
           <a:lstStyle>
             <a:lvl1pPr algn="ctr">
-              <a:defRPr sz="3600"/>
+              <a:defRPr sz="10800"/>
             </a:lvl1pPr>
           </a:lstStyle>
           <a:p>
@@ -173,8 +173,8 @@
         </p:nvSpPr>
         <p:spPr>
           <a:xfrm>
-            <a:off x="685800" y="7684348"/>
-            <a:ext cx="4114800" cy="3532292"/>
+            <a:off x="2057400" y="7924484"/>
+            <a:ext cx="12344400" cy="3642676"/>
           </a:xfrm>
         </p:spPr>
         <p:txBody>
@@ -182,39 +182,39 @@
           <a:lstStyle>
             <a:lvl1pPr marL="0" indent="0" algn="ctr">
               <a:buNone/>
-              <a:defRPr sz="1440"/>
+              <a:defRPr sz="4320"/>
             </a:lvl1pPr>
-            <a:lvl2pPr marL="274320" indent="0" algn="ctr">
-              <a:buNone/>
-              <a:defRPr sz="1200"/>
+            <a:lvl2pPr marL="822960" indent="0" algn="ctr">
+              <a:buNone/>
+              <a:defRPr sz="3600"/>
             </a:lvl2pPr>
-            <a:lvl3pPr marL="548640" indent="0" algn="ctr">
-              <a:buNone/>
-              <a:defRPr sz="1080"/>
+            <a:lvl3pPr marL="1645920" indent="0" algn="ctr">
+              <a:buNone/>
+              <a:defRPr sz="3240"/>
             </a:lvl3pPr>
-            <a:lvl4pPr marL="822960" indent="0" algn="ctr">
-              <a:buNone/>
-              <a:defRPr sz="960"/>
+            <a:lvl4pPr marL="2468880" indent="0" algn="ctr">
+              <a:buNone/>
+              <a:defRPr sz="2880"/>
             </a:lvl4pPr>
-            <a:lvl5pPr marL="1097280" indent="0" algn="ctr">
-              <a:buNone/>
-              <a:defRPr sz="960"/>
+            <a:lvl5pPr marL="3291840" indent="0" algn="ctr">
+              <a:buNone/>
+              <a:defRPr sz="2880"/>
             </a:lvl5pPr>
-            <a:lvl6pPr marL="1371600" indent="0" algn="ctr">
-              <a:buNone/>
-              <a:defRPr sz="960"/>
+            <a:lvl6pPr marL="4114800" indent="0" algn="ctr">
+              <a:buNone/>
+              <a:defRPr sz="2880"/>
             </a:lvl6pPr>
-            <a:lvl7pPr marL="1645920" indent="0" algn="ctr">
-              <a:buNone/>
-              <a:defRPr sz="960"/>
+            <a:lvl7pPr marL="4937760" indent="0" algn="ctr">
+              <a:buNone/>
+              <a:defRPr sz="2880"/>
             </a:lvl7pPr>
-            <a:lvl8pPr marL="1920240" indent="0" algn="ctr">
-              <a:buNone/>
-              <a:defRPr sz="960"/>
+            <a:lvl8pPr marL="5760720" indent="0" algn="ctr">
+              <a:buNone/>
+              <a:defRPr sz="2880"/>
             </a:lvl8pPr>
-            <a:lvl9pPr marL="2194560" indent="0" algn="ctr">
-              <a:buNone/>
-              <a:defRPr sz="960"/>
+            <a:lvl9pPr marL="6583680" indent="0" algn="ctr">
+              <a:buNone/>
+              <a:defRPr sz="2880"/>
             </a:lvl9pPr>
           </a:lstStyle>
           <a:p>
@@ -243,7 +243,7 @@
           <a:p>
             <a:fld id="{CFC60B5F-2253-DF41-8690-61B53F1555CE}" type="datetimeFigureOut">
               <a:rPr lang="en-US" smtClean="0"/>
-              <a:t>4/19/24</a:t>
+              <a:t>6/14/24</a:t>
             </a:fld>
             <a:endParaRPr lang="en-US"/>
           </a:p>
@@ -294,7 +294,7 @@
     </p:spTree>
     <p:extLst>
       <p:ext uri="{BB962C8B-B14F-4D97-AF65-F5344CB8AC3E}">
-        <p14:creationId xmlns:p14="http://schemas.microsoft.com/office/powerpoint/2010/main" val="3749677186"/>
+        <p14:creationId xmlns:p14="http://schemas.microsoft.com/office/powerpoint/2010/main" val="409129964"/>
       </p:ext>
     </p:extLst>
   </p:cSld>
@@ -413,7 +413,7 @@
           <a:p>
             <a:fld id="{CFC60B5F-2253-DF41-8690-61B53F1555CE}" type="datetimeFigureOut">
               <a:rPr lang="en-US" smtClean="0"/>
-              <a:t>4/19/24</a:t>
+              <a:t>6/14/24</a:t>
             </a:fld>
             <a:endParaRPr lang="en-US"/>
           </a:p>
@@ -464,7 +464,7 @@
     </p:spTree>
     <p:extLst>
       <p:ext uri="{BB962C8B-B14F-4D97-AF65-F5344CB8AC3E}">
-        <p14:creationId xmlns:p14="http://schemas.microsoft.com/office/powerpoint/2010/main" val="173648040"/>
+        <p14:creationId xmlns:p14="http://schemas.microsoft.com/office/powerpoint/2010/main" val="330092085"/>
       </p:ext>
     </p:extLst>
   </p:cSld>
@@ -503,8 +503,8 @@
         </p:nvSpPr>
         <p:spPr>
           <a:xfrm>
-            <a:off x="3926205" y="778933"/>
-            <a:ext cx="1183005" cy="12398588"/>
+            <a:off x="11778616" y="803275"/>
+            <a:ext cx="3549015" cy="12786044"/>
           </a:xfrm>
         </p:spPr>
         <p:txBody>
@@ -531,8 +531,8 @@
         </p:nvSpPr>
         <p:spPr>
           <a:xfrm>
-            <a:off x="377190" y="778933"/>
-            <a:ext cx="3480435" cy="12398588"/>
+            <a:off x="1131571" y="803275"/>
+            <a:ext cx="10441305" cy="12786044"/>
           </a:xfrm>
         </p:spPr>
         <p:txBody>
@@ -593,7 +593,7 @@
           <a:p>
             <a:fld id="{CFC60B5F-2253-DF41-8690-61B53F1555CE}" type="datetimeFigureOut">
               <a:rPr lang="en-US" smtClean="0"/>
-              <a:t>4/19/24</a:t>
+              <a:t>6/14/24</a:t>
             </a:fld>
             <a:endParaRPr lang="en-US"/>
           </a:p>
@@ -644,7 +644,7 @@
     </p:spTree>
     <p:extLst>
       <p:ext uri="{BB962C8B-B14F-4D97-AF65-F5344CB8AC3E}">
-        <p14:creationId xmlns:p14="http://schemas.microsoft.com/office/powerpoint/2010/main" val="3755037872"/>
+        <p14:creationId xmlns:p14="http://schemas.microsoft.com/office/powerpoint/2010/main" val="2798792733"/>
       </p:ext>
     </p:extLst>
   </p:cSld>
@@ -763,7 +763,7 @@
           <a:p>
             <a:fld id="{CFC60B5F-2253-DF41-8690-61B53F1555CE}" type="datetimeFigureOut">
               <a:rPr lang="en-US" smtClean="0"/>
-              <a:t>4/19/24</a:t>
+              <a:t>6/14/24</a:t>
             </a:fld>
             <a:endParaRPr lang="en-US"/>
           </a:p>
@@ -814,7 +814,7 @@
     </p:spTree>
     <p:extLst>
       <p:ext uri="{BB962C8B-B14F-4D97-AF65-F5344CB8AC3E}">
-        <p14:creationId xmlns:p14="http://schemas.microsoft.com/office/powerpoint/2010/main" val="3823264418"/>
+        <p14:creationId xmlns:p14="http://schemas.microsoft.com/office/powerpoint/2010/main" val="886573815"/>
       </p:ext>
     </p:extLst>
   </p:cSld>
@@ -853,15 +853,15 @@
         </p:nvSpPr>
         <p:spPr>
           <a:xfrm>
-            <a:off x="374333" y="3647444"/>
-            <a:ext cx="4732020" cy="6085839"/>
+            <a:off x="1122998" y="3761427"/>
+            <a:ext cx="14196060" cy="6276021"/>
           </a:xfrm>
         </p:spPr>
         <p:txBody>
           <a:bodyPr anchor="b"/>
           <a:lstStyle>
             <a:lvl1pPr>
-              <a:defRPr sz="3600"/>
+              <a:defRPr sz="10800"/>
             </a:lvl1pPr>
           </a:lstStyle>
           <a:p>
@@ -885,8 +885,8 @@
         </p:nvSpPr>
         <p:spPr>
           <a:xfrm>
-            <a:off x="374333" y="9790858"/>
-            <a:ext cx="4732020" cy="3200399"/>
+            <a:off x="1122998" y="10096822"/>
+            <a:ext cx="14196060" cy="3300411"/>
           </a:xfrm>
         </p:spPr>
         <p:txBody>
@@ -894,15 +894,15 @@
           <a:lstStyle>
             <a:lvl1pPr marL="0" indent="0">
               <a:buNone/>
-              <a:defRPr sz="1440">
+              <a:defRPr sz="4320">
                 <a:solidFill>
                   <a:schemeClr val="tx1"/>
                 </a:solidFill>
               </a:defRPr>
             </a:lvl1pPr>
-            <a:lvl2pPr marL="274320" indent="0">
-              <a:buNone/>
-              <a:defRPr sz="1200">
+            <a:lvl2pPr marL="822960" indent="0">
+              <a:buNone/>
+              <a:defRPr sz="3600">
                 <a:solidFill>
                   <a:schemeClr val="tx1">
                     <a:tint val="75000"/>
@@ -910,9 +910,9 @@
                 </a:solidFill>
               </a:defRPr>
             </a:lvl2pPr>
-            <a:lvl3pPr marL="548640" indent="0">
-              <a:buNone/>
-              <a:defRPr sz="1080">
+            <a:lvl3pPr marL="1645920" indent="0">
+              <a:buNone/>
+              <a:defRPr sz="3240">
                 <a:solidFill>
                   <a:schemeClr val="tx1">
                     <a:tint val="75000"/>
@@ -920,9 +920,9 @@
                 </a:solidFill>
               </a:defRPr>
             </a:lvl3pPr>
-            <a:lvl4pPr marL="822960" indent="0">
-              <a:buNone/>
-              <a:defRPr sz="960">
+            <a:lvl4pPr marL="2468880" indent="0">
+              <a:buNone/>
+              <a:defRPr sz="2880">
                 <a:solidFill>
                   <a:schemeClr val="tx1">
                     <a:tint val="75000"/>
@@ -930,9 +930,9 @@
                 </a:solidFill>
               </a:defRPr>
             </a:lvl4pPr>
-            <a:lvl5pPr marL="1097280" indent="0">
-              <a:buNone/>
-              <a:defRPr sz="960">
+            <a:lvl5pPr marL="3291840" indent="0">
+              <a:buNone/>
+              <a:defRPr sz="2880">
                 <a:solidFill>
                   <a:schemeClr val="tx1">
                     <a:tint val="75000"/>
@@ -940,9 +940,9 @@
                 </a:solidFill>
               </a:defRPr>
             </a:lvl5pPr>
-            <a:lvl6pPr marL="1371600" indent="0">
-              <a:buNone/>
-              <a:defRPr sz="960">
+            <a:lvl6pPr marL="4114800" indent="0">
+              <a:buNone/>
+              <a:defRPr sz="2880">
                 <a:solidFill>
                   <a:schemeClr val="tx1">
                     <a:tint val="75000"/>
@@ -950,9 +950,9 @@
                 </a:solidFill>
               </a:defRPr>
             </a:lvl6pPr>
-            <a:lvl7pPr marL="1645920" indent="0">
-              <a:buNone/>
-              <a:defRPr sz="960">
+            <a:lvl7pPr marL="4937760" indent="0">
+              <a:buNone/>
+              <a:defRPr sz="2880">
                 <a:solidFill>
                   <a:schemeClr val="tx1">
                     <a:tint val="75000"/>
@@ -960,9 +960,9 @@
                 </a:solidFill>
               </a:defRPr>
             </a:lvl7pPr>
-            <a:lvl8pPr marL="1920240" indent="0">
-              <a:buNone/>
-              <a:defRPr sz="960">
+            <a:lvl8pPr marL="5760720" indent="0">
+              <a:buNone/>
+              <a:defRPr sz="2880">
                 <a:solidFill>
                   <a:schemeClr val="tx1">
                     <a:tint val="75000"/>
@@ -970,9 +970,9 @@
                 </a:solidFill>
               </a:defRPr>
             </a:lvl8pPr>
-            <a:lvl9pPr marL="2194560" indent="0">
-              <a:buNone/>
-              <a:defRPr sz="960">
+            <a:lvl9pPr marL="6583680" indent="0">
+              <a:buNone/>
+              <a:defRPr sz="2880">
                 <a:solidFill>
                   <a:schemeClr val="tx1">
                     <a:tint val="75000"/>
@@ -1007,7 +1007,7 @@
           <a:p>
             <a:fld id="{CFC60B5F-2253-DF41-8690-61B53F1555CE}" type="datetimeFigureOut">
               <a:rPr lang="en-US" smtClean="0"/>
-              <a:t>4/19/24</a:t>
+              <a:t>6/14/24</a:t>
             </a:fld>
             <a:endParaRPr lang="en-US"/>
           </a:p>
@@ -1058,7 +1058,7 @@
     </p:spTree>
     <p:extLst>
       <p:ext uri="{BB962C8B-B14F-4D97-AF65-F5344CB8AC3E}">
-        <p14:creationId xmlns:p14="http://schemas.microsoft.com/office/powerpoint/2010/main" val="169823208"/>
+        <p14:creationId xmlns:p14="http://schemas.microsoft.com/office/powerpoint/2010/main" val="2134812059"/>
       </p:ext>
     </p:extLst>
   </p:cSld>
@@ -1120,8 +1120,8 @@
         </p:nvSpPr>
         <p:spPr>
           <a:xfrm>
-            <a:off x="377190" y="3894667"/>
-            <a:ext cx="2331720" cy="9282854"/>
+            <a:off x="1131570" y="4016375"/>
+            <a:ext cx="6995160" cy="9572944"/>
           </a:xfrm>
         </p:spPr>
         <p:txBody>
@@ -1177,8 +1177,8 @@
         </p:nvSpPr>
         <p:spPr>
           <a:xfrm>
-            <a:off x="2777490" y="3894667"/>
-            <a:ext cx="2331720" cy="9282854"/>
+            <a:off x="8332470" y="4016375"/>
+            <a:ext cx="6995160" cy="9572944"/>
           </a:xfrm>
         </p:spPr>
         <p:txBody>
@@ -1239,7 +1239,7 @@
           <a:p>
             <a:fld id="{CFC60B5F-2253-DF41-8690-61B53F1555CE}" type="datetimeFigureOut">
               <a:rPr lang="en-US" smtClean="0"/>
-              <a:t>4/19/24</a:t>
+              <a:t>6/14/24</a:t>
             </a:fld>
             <a:endParaRPr lang="en-US"/>
           </a:p>
@@ -1290,7 +1290,7 @@
     </p:spTree>
     <p:extLst>
       <p:ext uri="{BB962C8B-B14F-4D97-AF65-F5344CB8AC3E}">
-        <p14:creationId xmlns:p14="http://schemas.microsoft.com/office/powerpoint/2010/main" val="238549254"/>
+        <p14:creationId xmlns:p14="http://schemas.microsoft.com/office/powerpoint/2010/main" val="3183209156"/>
       </p:ext>
     </p:extLst>
   </p:cSld>
@@ -1329,8 +1329,8 @@
         </p:nvSpPr>
         <p:spPr>
           <a:xfrm>
-            <a:off x="377905" y="778936"/>
-            <a:ext cx="4732020" cy="2827868"/>
+            <a:off x="1133714" y="803278"/>
+            <a:ext cx="14196060" cy="2916239"/>
           </a:xfrm>
         </p:spPr>
         <p:txBody>
@@ -1357,8 +1357,8 @@
         </p:nvSpPr>
         <p:spPr>
           <a:xfrm>
-            <a:off x="377905" y="3586481"/>
-            <a:ext cx="2321004" cy="1757679"/>
+            <a:off x="1133716" y="3698559"/>
+            <a:ext cx="6963012" cy="1812606"/>
           </a:xfrm>
         </p:spPr>
         <p:txBody>
@@ -1366,39 +1366,39 @@
           <a:lstStyle>
             <a:lvl1pPr marL="0" indent="0">
               <a:buNone/>
-              <a:defRPr sz="1440" b="1"/>
+              <a:defRPr sz="4320" b="1"/>
             </a:lvl1pPr>
-            <a:lvl2pPr marL="274320" indent="0">
-              <a:buNone/>
-              <a:defRPr sz="1200" b="1"/>
+            <a:lvl2pPr marL="822960" indent="0">
+              <a:buNone/>
+              <a:defRPr sz="3600" b="1"/>
             </a:lvl2pPr>
-            <a:lvl3pPr marL="548640" indent="0">
-              <a:buNone/>
-              <a:defRPr sz="1080" b="1"/>
+            <a:lvl3pPr marL="1645920" indent="0">
+              <a:buNone/>
+              <a:defRPr sz="3240" b="1"/>
             </a:lvl3pPr>
-            <a:lvl4pPr marL="822960" indent="0">
-              <a:buNone/>
-              <a:defRPr sz="960" b="1"/>
+            <a:lvl4pPr marL="2468880" indent="0">
+              <a:buNone/>
+              <a:defRPr sz="2880" b="1"/>
             </a:lvl4pPr>
-            <a:lvl5pPr marL="1097280" indent="0">
-              <a:buNone/>
-              <a:defRPr sz="960" b="1"/>
+            <a:lvl5pPr marL="3291840" indent="0">
+              <a:buNone/>
+              <a:defRPr sz="2880" b="1"/>
             </a:lvl5pPr>
-            <a:lvl6pPr marL="1371600" indent="0">
-              <a:buNone/>
-              <a:defRPr sz="960" b="1"/>
+            <a:lvl6pPr marL="4114800" indent="0">
+              <a:buNone/>
+              <a:defRPr sz="2880" b="1"/>
             </a:lvl6pPr>
-            <a:lvl7pPr marL="1645920" indent="0">
-              <a:buNone/>
-              <a:defRPr sz="960" b="1"/>
+            <a:lvl7pPr marL="4937760" indent="0">
+              <a:buNone/>
+              <a:defRPr sz="2880" b="1"/>
             </a:lvl7pPr>
-            <a:lvl8pPr marL="1920240" indent="0">
-              <a:buNone/>
-              <a:defRPr sz="960" b="1"/>
+            <a:lvl8pPr marL="5760720" indent="0">
+              <a:buNone/>
+              <a:defRPr sz="2880" b="1"/>
             </a:lvl8pPr>
-            <a:lvl9pPr marL="2194560" indent="0">
-              <a:buNone/>
-              <a:defRPr sz="960" b="1"/>
+            <a:lvl9pPr marL="6583680" indent="0">
+              <a:buNone/>
+              <a:defRPr sz="2880" b="1"/>
             </a:lvl9pPr>
           </a:lstStyle>
           <a:p>
@@ -1422,8 +1422,8 @@
         </p:nvSpPr>
         <p:spPr>
           <a:xfrm>
-            <a:off x="377905" y="5344160"/>
-            <a:ext cx="2321004" cy="7860454"/>
+            <a:off x="1133716" y="5511165"/>
+            <a:ext cx="6963012" cy="8106094"/>
           </a:xfrm>
         </p:spPr>
         <p:txBody>
@@ -1479,8 +1479,8 @@
         </p:nvSpPr>
         <p:spPr>
           <a:xfrm>
-            <a:off x="2777490" y="3586481"/>
-            <a:ext cx="2332435" cy="1757679"/>
+            <a:off x="8332471" y="3698559"/>
+            <a:ext cx="6997304" cy="1812606"/>
           </a:xfrm>
         </p:spPr>
         <p:txBody>
@@ -1488,39 +1488,39 @@
           <a:lstStyle>
             <a:lvl1pPr marL="0" indent="0">
               <a:buNone/>
-              <a:defRPr sz="1440" b="1"/>
+              <a:defRPr sz="4320" b="1"/>
             </a:lvl1pPr>
-            <a:lvl2pPr marL="274320" indent="0">
-              <a:buNone/>
-              <a:defRPr sz="1200" b="1"/>
+            <a:lvl2pPr marL="822960" indent="0">
+              <a:buNone/>
+              <a:defRPr sz="3600" b="1"/>
             </a:lvl2pPr>
-            <a:lvl3pPr marL="548640" indent="0">
-              <a:buNone/>
-              <a:defRPr sz="1080" b="1"/>
+            <a:lvl3pPr marL="1645920" indent="0">
+              <a:buNone/>
+              <a:defRPr sz="3240" b="1"/>
             </a:lvl3pPr>
-            <a:lvl4pPr marL="822960" indent="0">
-              <a:buNone/>
-              <a:defRPr sz="960" b="1"/>
+            <a:lvl4pPr marL="2468880" indent="0">
+              <a:buNone/>
+              <a:defRPr sz="2880" b="1"/>
             </a:lvl4pPr>
-            <a:lvl5pPr marL="1097280" indent="0">
-              <a:buNone/>
-              <a:defRPr sz="960" b="1"/>
+            <a:lvl5pPr marL="3291840" indent="0">
+              <a:buNone/>
+              <a:defRPr sz="2880" b="1"/>
             </a:lvl5pPr>
-            <a:lvl6pPr marL="1371600" indent="0">
-              <a:buNone/>
-              <a:defRPr sz="960" b="1"/>
+            <a:lvl6pPr marL="4114800" indent="0">
+              <a:buNone/>
+              <a:defRPr sz="2880" b="1"/>
             </a:lvl6pPr>
-            <a:lvl7pPr marL="1645920" indent="0">
-              <a:buNone/>
-              <a:defRPr sz="960" b="1"/>
+            <a:lvl7pPr marL="4937760" indent="0">
+              <a:buNone/>
+              <a:defRPr sz="2880" b="1"/>
             </a:lvl7pPr>
-            <a:lvl8pPr marL="1920240" indent="0">
-              <a:buNone/>
-              <a:defRPr sz="960" b="1"/>
+            <a:lvl8pPr marL="5760720" indent="0">
+              <a:buNone/>
+              <a:defRPr sz="2880" b="1"/>
             </a:lvl8pPr>
-            <a:lvl9pPr marL="2194560" indent="0">
-              <a:buNone/>
-              <a:defRPr sz="960" b="1"/>
+            <a:lvl9pPr marL="6583680" indent="0">
+              <a:buNone/>
+              <a:defRPr sz="2880" b="1"/>
             </a:lvl9pPr>
           </a:lstStyle>
           <a:p>
@@ -1544,8 +1544,8 @@
         </p:nvSpPr>
         <p:spPr>
           <a:xfrm>
-            <a:off x="2777490" y="5344160"/>
-            <a:ext cx="2332435" cy="7860454"/>
+            <a:off x="8332471" y="5511165"/>
+            <a:ext cx="6997304" cy="8106094"/>
           </a:xfrm>
         </p:spPr>
         <p:txBody>
@@ -1606,7 +1606,7 @@
           <a:p>
             <a:fld id="{CFC60B5F-2253-DF41-8690-61B53F1555CE}" type="datetimeFigureOut">
               <a:rPr lang="en-US" smtClean="0"/>
-              <a:t>4/19/24</a:t>
+              <a:t>6/14/24</a:t>
             </a:fld>
             <a:endParaRPr lang="en-US"/>
           </a:p>
@@ -1657,7 +1657,7 @@
     </p:spTree>
     <p:extLst>
       <p:ext uri="{BB962C8B-B14F-4D97-AF65-F5344CB8AC3E}">
-        <p14:creationId xmlns:p14="http://schemas.microsoft.com/office/powerpoint/2010/main" val="1537999887"/>
+        <p14:creationId xmlns:p14="http://schemas.microsoft.com/office/powerpoint/2010/main" val="80266108"/>
       </p:ext>
     </p:extLst>
   </p:cSld>
@@ -1724,7 +1724,7 @@
           <a:p>
             <a:fld id="{CFC60B5F-2253-DF41-8690-61B53F1555CE}" type="datetimeFigureOut">
               <a:rPr lang="en-US" smtClean="0"/>
-              <a:t>4/19/24</a:t>
+              <a:t>6/14/24</a:t>
             </a:fld>
             <a:endParaRPr lang="en-US"/>
           </a:p>
@@ -1775,7 +1775,7 @@
     </p:spTree>
     <p:extLst>
       <p:ext uri="{BB962C8B-B14F-4D97-AF65-F5344CB8AC3E}">
-        <p14:creationId xmlns:p14="http://schemas.microsoft.com/office/powerpoint/2010/main" val="2001575313"/>
+        <p14:creationId xmlns:p14="http://schemas.microsoft.com/office/powerpoint/2010/main" val="4154383417"/>
       </p:ext>
     </p:extLst>
   </p:cSld>
@@ -1819,7 +1819,7 @@
           <a:p>
             <a:fld id="{CFC60B5F-2253-DF41-8690-61B53F1555CE}" type="datetimeFigureOut">
               <a:rPr lang="en-US" smtClean="0"/>
-              <a:t>4/19/24</a:t>
+              <a:t>6/14/24</a:t>
             </a:fld>
             <a:endParaRPr lang="en-US"/>
           </a:p>
@@ -1870,7 +1870,7 @@
     </p:spTree>
     <p:extLst>
       <p:ext uri="{BB962C8B-B14F-4D97-AF65-F5344CB8AC3E}">
-        <p14:creationId xmlns:p14="http://schemas.microsoft.com/office/powerpoint/2010/main" val="2501549114"/>
+        <p14:creationId xmlns:p14="http://schemas.microsoft.com/office/powerpoint/2010/main" val="2035659192"/>
       </p:ext>
     </p:extLst>
   </p:cSld>
@@ -1909,15 +1909,15 @@
         </p:nvSpPr>
         <p:spPr>
           <a:xfrm>
-            <a:off x="377905" y="975360"/>
-            <a:ext cx="1769507" cy="3413760"/>
+            <a:off x="1133714" y="1005840"/>
+            <a:ext cx="5308520" cy="3520440"/>
           </a:xfrm>
         </p:spPr>
         <p:txBody>
           <a:bodyPr anchor="b"/>
           <a:lstStyle>
             <a:lvl1pPr>
-              <a:defRPr sz="1920"/>
+              <a:defRPr sz="5760"/>
             </a:lvl1pPr>
           </a:lstStyle>
           <a:p>
@@ -1941,39 +1941,39 @@
         </p:nvSpPr>
         <p:spPr>
           <a:xfrm>
-            <a:off x="2332435" y="2106510"/>
-            <a:ext cx="2777490" cy="10397067"/>
+            <a:off x="6997304" y="2172338"/>
+            <a:ext cx="8332470" cy="10721975"/>
           </a:xfrm>
         </p:spPr>
         <p:txBody>
           <a:bodyPr/>
           <a:lstStyle>
             <a:lvl1pPr>
-              <a:defRPr sz="1920"/>
+              <a:defRPr sz="5760"/>
             </a:lvl1pPr>
             <a:lvl2pPr>
-              <a:defRPr sz="1680"/>
+              <a:defRPr sz="5040"/>
             </a:lvl2pPr>
             <a:lvl3pPr>
-              <a:defRPr sz="1440"/>
+              <a:defRPr sz="4320"/>
             </a:lvl3pPr>
             <a:lvl4pPr>
-              <a:defRPr sz="1200"/>
+              <a:defRPr sz="3600"/>
             </a:lvl4pPr>
             <a:lvl5pPr>
-              <a:defRPr sz="1200"/>
+              <a:defRPr sz="3600"/>
             </a:lvl5pPr>
             <a:lvl6pPr>
-              <a:defRPr sz="1200"/>
+              <a:defRPr sz="3600"/>
             </a:lvl6pPr>
             <a:lvl7pPr>
-              <a:defRPr sz="1200"/>
+              <a:defRPr sz="3600"/>
             </a:lvl7pPr>
             <a:lvl8pPr>
-              <a:defRPr sz="1200"/>
+              <a:defRPr sz="3600"/>
             </a:lvl8pPr>
             <a:lvl9pPr>
-              <a:defRPr sz="1200"/>
+              <a:defRPr sz="3600"/>
             </a:lvl9pPr>
           </a:lstStyle>
           <a:p>
@@ -2026,8 +2026,8 @@
         </p:nvSpPr>
         <p:spPr>
           <a:xfrm>
-            <a:off x="377905" y="4389120"/>
-            <a:ext cx="1769507" cy="8131388"/>
+            <a:off x="1133714" y="4526280"/>
+            <a:ext cx="5308520" cy="8385494"/>
           </a:xfrm>
         </p:spPr>
         <p:txBody>
@@ -2035,39 +2035,39 @@
           <a:lstStyle>
             <a:lvl1pPr marL="0" indent="0">
               <a:buNone/>
-              <a:defRPr sz="960"/>
+              <a:defRPr sz="2880"/>
             </a:lvl1pPr>
-            <a:lvl2pPr marL="274320" indent="0">
-              <a:buNone/>
-              <a:defRPr sz="840"/>
+            <a:lvl2pPr marL="822960" indent="0">
+              <a:buNone/>
+              <a:defRPr sz="2520"/>
             </a:lvl2pPr>
-            <a:lvl3pPr marL="548640" indent="0">
-              <a:buNone/>
-              <a:defRPr sz="720"/>
+            <a:lvl3pPr marL="1645920" indent="0">
+              <a:buNone/>
+              <a:defRPr sz="2160"/>
             </a:lvl3pPr>
-            <a:lvl4pPr marL="822960" indent="0">
-              <a:buNone/>
-              <a:defRPr sz="600"/>
+            <a:lvl4pPr marL="2468880" indent="0">
+              <a:buNone/>
+              <a:defRPr sz="1800"/>
             </a:lvl4pPr>
-            <a:lvl5pPr marL="1097280" indent="0">
-              <a:buNone/>
-              <a:defRPr sz="600"/>
+            <a:lvl5pPr marL="3291840" indent="0">
+              <a:buNone/>
+              <a:defRPr sz="1800"/>
             </a:lvl5pPr>
-            <a:lvl6pPr marL="1371600" indent="0">
-              <a:buNone/>
-              <a:defRPr sz="600"/>
+            <a:lvl6pPr marL="4114800" indent="0">
+              <a:buNone/>
+              <a:defRPr sz="1800"/>
             </a:lvl6pPr>
-            <a:lvl7pPr marL="1645920" indent="0">
-              <a:buNone/>
-              <a:defRPr sz="600"/>
+            <a:lvl7pPr marL="4937760" indent="0">
+              <a:buNone/>
+              <a:defRPr sz="1800"/>
             </a:lvl7pPr>
-            <a:lvl8pPr marL="1920240" indent="0">
-              <a:buNone/>
-              <a:defRPr sz="600"/>
+            <a:lvl8pPr marL="5760720" indent="0">
+              <a:buNone/>
+              <a:defRPr sz="1800"/>
             </a:lvl8pPr>
-            <a:lvl9pPr marL="2194560" indent="0">
-              <a:buNone/>
-              <a:defRPr sz="600"/>
+            <a:lvl9pPr marL="6583680" indent="0">
+              <a:buNone/>
+              <a:defRPr sz="1800"/>
             </a:lvl9pPr>
           </a:lstStyle>
           <a:p>
@@ -2096,7 +2096,7 @@
           <a:p>
             <a:fld id="{CFC60B5F-2253-DF41-8690-61B53F1555CE}" type="datetimeFigureOut">
               <a:rPr lang="en-US" smtClean="0"/>
-              <a:t>4/19/24</a:t>
+              <a:t>6/14/24</a:t>
             </a:fld>
             <a:endParaRPr lang="en-US"/>
           </a:p>
@@ -2147,7 +2147,7 @@
     </p:spTree>
     <p:extLst>
       <p:ext uri="{BB962C8B-B14F-4D97-AF65-F5344CB8AC3E}">
-        <p14:creationId xmlns:p14="http://schemas.microsoft.com/office/powerpoint/2010/main" val="4289702480"/>
+        <p14:creationId xmlns:p14="http://schemas.microsoft.com/office/powerpoint/2010/main" val="1604027672"/>
       </p:ext>
     </p:extLst>
   </p:cSld>
@@ -2186,15 +2186,15 @@
         </p:nvSpPr>
         <p:spPr>
           <a:xfrm>
-            <a:off x="377905" y="975360"/>
-            <a:ext cx="1769507" cy="3413760"/>
+            <a:off x="1133714" y="1005840"/>
+            <a:ext cx="5308520" cy="3520440"/>
           </a:xfrm>
         </p:spPr>
         <p:txBody>
           <a:bodyPr anchor="b"/>
           <a:lstStyle>
             <a:lvl1pPr>
-              <a:defRPr sz="1920"/>
+              <a:defRPr sz="5760"/>
             </a:lvl1pPr>
           </a:lstStyle>
           <a:p>
@@ -2218,8 +2218,8 @@
         </p:nvSpPr>
         <p:spPr>
           <a:xfrm>
-            <a:off x="2332435" y="2106510"/>
-            <a:ext cx="2777490" cy="10397067"/>
+            <a:off x="6997304" y="2172338"/>
+            <a:ext cx="8332470" cy="10721975"/>
           </a:xfrm>
         </p:spPr>
         <p:txBody>
@@ -2227,39 +2227,39 @@
           <a:lstStyle>
             <a:lvl1pPr marL="0" indent="0">
               <a:buNone/>
-              <a:defRPr sz="1920"/>
+              <a:defRPr sz="5760"/>
             </a:lvl1pPr>
-            <a:lvl2pPr marL="274320" indent="0">
-              <a:buNone/>
-              <a:defRPr sz="1680"/>
+            <a:lvl2pPr marL="822960" indent="0">
+              <a:buNone/>
+              <a:defRPr sz="5040"/>
             </a:lvl2pPr>
-            <a:lvl3pPr marL="548640" indent="0">
-              <a:buNone/>
-              <a:defRPr sz="1440"/>
+            <a:lvl3pPr marL="1645920" indent="0">
+              <a:buNone/>
+              <a:defRPr sz="4320"/>
             </a:lvl3pPr>
-            <a:lvl4pPr marL="822960" indent="0">
-              <a:buNone/>
-              <a:defRPr sz="1200"/>
+            <a:lvl4pPr marL="2468880" indent="0">
+              <a:buNone/>
+              <a:defRPr sz="3600"/>
             </a:lvl4pPr>
-            <a:lvl5pPr marL="1097280" indent="0">
-              <a:buNone/>
-              <a:defRPr sz="1200"/>
+            <a:lvl5pPr marL="3291840" indent="0">
+              <a:buNone/>
+              <a:defRPr sz="3600"/>
             </a:lvl5pPr>
-            <a:lvl6pPr marL="1371600" indent="0">
-              <a:buNone/>
-              <a:defRPr sz="1200"/>
+            <a:lvl6pPr marL="4114800" indent="0">
+              <a:buNone/>
+              <a:defRPr sz="3600"/>
             </a:lvl6pPr>
-            <a:lvl7pPr marL="1645920" indent="0">
-              <a:buNone/>
-              <a:defRPr sz="1200"/>
+            <a:lvl7pPr marL="4937760" indent="0">
+              <a:buNone/>
+              <a:defRPr sz="3600"/>
             </a:lvl7pPr>
-            <a:lvl8pPr marL="1920240" indent="0">
-              <a:buNone/>
-              <a:defRPr sz="1200"/>
+            <a:lvl8pPr marL="5760720" indent="0">
+              <a:buNone/>
+              <a:defRPr sz="3600"/>
             </a:lvl8pPr>
-            <a:lvl9pPr marL="2194560" indent="0">
-              <a:buNone/>
-              <a:defRPr sz="1200"/>
+            <a:lvl9pPr marL="6583680" indent="0">
+              <a:buNone/>
+              <a:defRPr sz="3600"/>
             </a:lvl9pPr>
           </a:lstStyle>
           <a:p>
@@ -2283,8 +2283,8 @@
         </p:nvSpPr>
         <p:spPr>
           <a:xfrm>
-            <a:off x="377905" y="4389120"/>
-            <a:ext cx="1769507" cy="8131388"/>
+            <a:off x="1133714" y="4526280"/>
+            <a:ext cx="5308520" cy="8385494"/>
           </a:xfrm>
         </p:spPr>
         <p:txBody>
@@ -2292,39 +2292,39 @@
           <a:lstStyle>
             <a:lvl1pPr marL="0" indent="0">
               <a:buNone/>
-              <a:defRPr sz="960"/>
+              <a:defRPr sz="2880"/>
             </a:lvl1pPr>
-            <a:lvl2pPr marL="274320" indent="0">
-              <a:buNone/>
-              <a:defRPr sz="840"/>
+            <a:lvl2pPr marL="822960" indent="0">
+              <a:buNone/>
+              <a:defRPr sz="2520"/>
             </a:lvl2pPr>
-            <a:lvl3pPr marL="548640" indent="0">
-              <a:buNone/>
-              <a:defRPr sz="720"/>
+            <a:lvl3pPr marL="1645920" indent="0">
+              <a:buNone/>
+              <a:defRPr sz="2160"/>
             </a:lvl3pPr>
-            <a:lvl4pPr marL="822960" indent="0">
-              <a:buNone/>
-              <a:defRPr sz="600"/>
+            <a:lvl4pPr marL="2468880" indent="0">
+              <a:buNone/>
+              <a:defRPr sz="1800"/>
             </a:lvl4pPr>
-            <a:lvl5pPr marL="1097280" indent="0">
-              <a:buNone/>
-              <a:defRPr sz="600"/>
+            <a:lvl5pPr marL="3291840" indent="0">
+              <a:buNone/>
+              <a:defRPr sz="1800"/>
             </a:lvl5pPr>
-            <a:lvl6pPr marL="1371600" indent="0">
-              <a:buNone/>
-              <a:defRPr sz="600"/>
+            <a:lvl6pPr marL="4114800" indent="0">
+              <a:buNone/>
+              <a:defRPr sz="1800"/>
             </a:lvl6pPr>
-            <a:lvl7pPr marL="1645920" indent="0">
-              <a:buNone/>
-              <a:defRPr sz="600"/>
+            <a:lvl7pPr marL="4937760" indent="0">
+              <a:buNone/>
+              <a:defRPr sz="1800"/>
             </a:lvl7pPr>
-            <a:lvl8pPr marL="1920240" indent="0">
-              <a:buNone/>
-              <a:defRPr sz="600"/>
+            <a:lvl8pPr marL="5760720" indent="0">
+              <a:buNone/>
+              <a:defRPr sz="1800"/>
             </a:lvl8pPr>
-            <a:lvl9pPr marL="2194560" indent="0">
-              <a:buNone/>
-              <a:defRPr sz="600"/>
+            <a:lvl9pPr marL="6583680" indent="0">
+              <a:buNone/>
+              <a:defRPr sz="1800"/>
             </a:lvl9pPr>
           </a:lstStyle>
           <a:p>
@@ -2353,7 +2353,7 @@
           <a:p>
             <a:fld id="{CFC60B5F-2253-DF41-8690-61B53F1555CE}" type="datetimeFigureOut">
               <a:rPr lang="en-US" smtClean="0"/>
-              <a:t>4/19/24</a:t>
+              <a:t>6/14/24</a:t>
             </a:fld>
             <a:endParaRPr lang="en-US"/>
           </a:p>
@@ -2404,7 +2404,7 @@
     </p:spTree>
     <p:extLst>
       <p:ext uri="{BB962C8B-B14F-4D97-AF65-F5344CB8AC3E}">
-        <p14:creationId xmlns:p14="http://schemas.microsoft.com/office/powerpoint/2010/main" val="937491941"/>
+        <p14:creationId xmlns:p14="http://schemas.microsoft.com/office/powerpoint/2010/main" val="3764548065"/>
       </p:ext>
     </p:extLst>
   </p:cSld>
@@ -2448,8 +2448,8 @@
         </p:nvSpPr>
         <p:spPr>
           <a:xfrm>
-            <a:off x="377190" y="778936"/>
-            <a:ext cx="4732020" cy="2827868"/>
+            <a:off x="1131570" y="803278"/>
+            <a:ext cx="14196060" cy="2916239"/>
           </a:xfrm>
           <a:prstGeom prst="rect">
             <a:avLst/>
@@ -2481,8 +2481,8 @@
         </p:nvSpPr>
         <p:spPr>
           <a:xfrm>
-            <a:off x="377190" y="3894667"/>
-            <a:ext cx="4732020" cy="9282854"/>
+            <a:off x="1131570" y="4016375"/>
+            <a:ext cx="14196060" cy="9572944"/>
           </a:xfrm>
           <a:prstGeom prst="rect">
             <a:avLst/>
@@ -2543,8 +2543,8 @@
         </p:nvSpPr>
         <p:spPr>
           <a:xfrm>
-            <a:off x="377190" y="13560217"/>
-            <a:ext cx="1234440" cy="778933"/>
+            <a:off x="1131570" y="13983973"/>
+            <a:ext cx="3703320" cy="803275"/>
           </a:xfrm>
           <a:prstGeom prst="rect">
             <a:avLst/>
@@ -2554,7 +2554,7 @@
           <a:bodyPr vert="horz" lIns="91440" tIns="45720" rIns="91440" bIns="45720" rtlCol="0" anchor="ctr"/>
           <a:lstStyle>
             <a:lvl1pPr algn="l">
-              <a:defRPr sz="720">
+              <a:defRPr sz="2160">
                 <a:solidFill>
                   <a:schemeClr val="tx1">
                     <a:tint val="75000"/>
@@ -2566,7 +2566,7 @@
           <a:p>
             <a:fld id="{CFC60B5F-2253-DF41-8690-61B53F1555CE}" type="datetimeFigureOut">
               <a:rPr lang="en-US" smtClean="0"/>
-              <a:t>4/19/24</a:t>
+              <a:t>6/14/24</a:t>
             </a:fld>
             <a:endParaRPr lang="en-US"/>
           </a:p>
@@ -2584,8 +2584,8 @@
         </p:nvSpPr>
         <p:spPr>
           <a:xfrm>
-            <a:off x="1817370" y="13560217"/>
-            <a:ext cx="1851660" cy="778933"/>
+            <a:off x="5452110" y="13983973"/>
+            <a:ext cx="5554980" cy="803275"/>
           </a:xfrm>
           <a:prstGeom prst="rect">
             <a:avLst/>
@@ -2595,7 +2595,7 @@
           <a:bodyPr vert="horz" lIns="91440" tIns="45720" rIns="91440" bIns="45720" rtlCol="0" anchor="ctr"/>
           <a:lstStyle>
             <a:lvl1pPr algn="ctr">
-              <a:defRPr sz="720">
+              <a:defRPr sz="2160">
                 <a:solidFill>
                   <a:schemeClr val="tx1">
                     <a:tint val="75000"/>
@@ -2621,8 +2621,8 @@
         </p:nvSpPr>
         <p:spPr>
           <a:xfrm>
-            <a:off x="3874770" y="13560217"/>
-            <a:ext cx="1234440" cy="778933"/>
+            <a:off x="11624310" y="13983973"/>
+            <a:ext cx="3703320" cy="803275"/>
           </a:xfrm>
           <a:prstGeom prst="rect">
             <a:avLst/>
@@ -2632,7 +2632,7 @@
           <a:bodyPr vert="horz" lIns="91440" tIns="45720" rIns="91440" bIns="45720" rtlCol="0" anchor="ctr"/>
           <a:lstStyle>
             <a:lvl1pPr algn="r">
-              <a:defRPr sz="720">
+              <a:defRPr sz="2160">
                 <a:solidFill>
                   <a:schemeClr val="tx1">
                     <a:tint val="75000"/>
@@ -2653,27 +2653,27 @@
     </p:spTree>
     <p:extLst>
       <p:ext uri="{BB962C8B-B14F-4D97-AF65-F5344CB8AC3E}">
-        <p14:creationId xmlns:p14="http://schemas.microsoft.com/office/powerpoint/2010/main" val="3828414224"/>
+        <p14:creationId xmlns:p14="http://schemas.microsoft.com/office/powerpoint/2010/main" val="700518322"/>
       </p:ext>
     </p:extLst>
   </p:cSld>
   <p:clrMap bg1="lt1" tx1="dk1" bg2="lt2" tx2="dk2" accent1="accent1" accent2="accent2" accent3="accent3" accent4="accent4" accent5="accent5" accent6="accent6" hlink="hlink" folHlink="folHlink"/>
   <p:sldLayoutIdLst>
-    <p:sldLayoutId id="2147483673" r:id="rId1"/>
-    <p:sldLayoutId id="2147483674" r:id="rId2"/>
-    <p:sldLayoutId id="2147483675" r:id="rId3"/>
-    <p:sldLayoutId id="2147483676" r:id="rId4"/>
-    <p:sldLayoutId id="2147483677" r:id="rId5"/>
-    <p:sldLayoutId id="2147483678" r:id="rId6"/>
-    <p:sldLayoutId id="2147483679" r:id="rId7"/>
-    <p:sldLayoutId id="2147483680" r:id="rId8"/>
-    <p:sldLayoutId id="2147483681" r:id="rId9"/>
-    <p:sldLayoutId id="2147483682" r:id="rId10"/>
-    <p:sldLayoutId id="2147483683" r:id="rId11"/>
+    <p:sldLayoutId id="2147483697" r:id="rId1"/>
+    <p:sldLayoutId id="2147483698" r:id="rId2"/>
+    <p:sldLayoutId id="2147483699" r:id="rId3"/>
+    <p:sldLayoutId id="2147483700" r:id="rId4"/>
+    <p:sldLayoutId id="2147483701" r:id="rId5"/>
+    <p:sldLayoutId id="2147483702" r:id="rId6"/>
+    <p:sldLayoutId id="2147483703" r:id="rId7"/>
+    <p:sldLayoutId id="2147483704" r:id="rId8"/>
+    <p:sldLayoutId id="2147483705" r:id="rId9"/>
+    <p:sldLayoutId id="2147483706" r:id="rId10"/>
+    <p:sldLayoutId id="2147483707" r:id="rId11"/>
   </p:sldLayoutIdLst>
   <p:txStyles>
     <p:titleStyle>
-      <a:lvl1pPr algn="l" defTabSz="548640" rtl="0" eaLnBrk="1" latinLnBrk="0" hangingPunct="1">
+      <a:lvl1pPr algn="l" defTabSz="1645920" rtl="0" eaLnBrk="1" latinLnBrk="0" hangingPunct="1">
         <a:lnSpc>
           <a:spcPct val="90000"/>
         </a:lnSpc>
@@ -2681,7 +2681,7 @@
           <a:spcPct val="0"/>
         </a:spcBef>
         <a:buNone/>
-        <a:defRPr sz="2640" kern="1200">
+        <a:defRPr sz="7920" kern="1200">
           <a:solidFill>
             <a:schemeClr val="tx1"/>
           </a:solidFill>
@@ -2692,16 +2692,16 @@
       </a:lvl1pPr>
     </p:titleStyle>
     <p:bodyStyle>
-      <a:lvl1pPr marL="137160" indent="-137160" algn="l" defTabSz="548640" rtl="0" eaLnBrk="1" latinLnBrk="0" hangingPunct="1">
+      <a:lvl1pPr marL="411480" indent="-411480" algn="l" defTabSz="1645920" rtl="0" eaLnBrk="1" latinLnBrk="0" hangingPunct="1">
         <a:lnSpc>
           <a:spcPct val="90000"/>
         </a:lnSpc>
         <a:spcBef>
-          <a:spcPts val="600"/>
+          <a:spcPts val="1800"/>
         </a:spcBef>
         <a:buFont typeface="Arial" panose="020B0604020202020204" pitchFamily="34" charset="0"/>
         <a:buChar char="•"/>
-        <a:defRPr sz="1680" kern="1200">
+        <a:defRPr sz="5040" kern="1200">
           <a:solidFill>
             <a:schemeClr val="tx1"/>
           </a:solidFill>
@@ -2710,16 +2710,16 @@
           <a:cs typeface="+mn-cs"/>
         </a:defRPr>
       </a:lvl1pPr>
-      <a:lvl2pPr marL="411480" indent="-137160" algn="l" defTabSz="548640" rtl="0" eaLnBrk="1" latinLnBrk="0" hangingPunct="1">
+      <a:lvl2pPr marL="1234440" indent="-411480" algn="l" defTabSz="1645920" rtl="0" eaLnBrk="1" latinLnBrk="0" hangingPunct="1">
         <a:lnSpc>
           <a:spcPct val="90000"/>
         </a:lnSpc>
         <a:spcBef>
-          <a:spcPts val="300"/>
+          <a:spcPts val="900"/>
         </a:spcBef>
         <a:buFont typeface="Arial" panose="020B0604020202020204" pitchFamily="34" charset="0"/>
         <a:buChar char="•"/>
-        <a:defRPr sz="1440" kern="1200">
+        <a:defRPr sz="4320" kern="1200">
           <a:solidFill>
             <a:schemeClr val="tx1"/>
           </a:solidFill>
@@ -2728,16 +2728,16 @@
           <a:cs typeface="+mn-cs"/>
         </a:defRPr>
       </a:lvl2pPr>
-      <a:lvl3pPr marL="685800" indent="-137160" algn="l" defTabSz="548640" rtl="0" eaLnBrk="1" latinLnBrk="0" hangingPunct="1">
+      <a:lvl3pPr marL="2057400" indent="-411480" algn="l" defTabSz="1645920" rtl="0" eaLnBrk="1" latinLnBrk="0" hangingPunct="1">
         <a:lnSpc>
           <a:spcPct val="90000"/>
         </a:lnSpc>
         <a:spcBef>
-          <a:spcPts val="300"/>
+          <a:spcPts val="900"/>
         </a:spcBef>
         <a:buFont typeface="Arial" panose="020B0604020202020204" pitchFamily="34" charset="0"/>
         <a:buChar char="•"/>
-        <a:defRPr sz="1200" kern="1200">
+        <a:defRPr sz="3600" kern="1200">
           <a:solidFill>
             <a:schemeClr val="tx1"/>
           </a:solidFill>
@@ -2746,16 +2746,16 @@
           <a:cs typeface="+mn-cs"/>
         </a:defRPr>
       </a:lvl3pPr>
-      <a:lvl4pPr marL="960120" indent="-137160" algn="l" defTabSz="548640" rtl="0" eaLnBrk="1" latinLnBrk="0" hangingPunct="1">
+      <a:lvl4pPr marL="2880360" indent="-411480" algn="l" defTabSz="1645920" rtl="0" eaLnBrk="1" latinLnBrk="0" hangingPunct="1">
         <a:lnSpc>
           <a:spcPct val="90000"/>
         </a:lnSpc>
         <a:spcBef>
-          <a:spcPts val="300"/>
+          <a:spcPts val="900"/>
         </a:spcBef>
         <a:buFont typeface="Arial" panose="020B0604020202020204" pitchFamily="34" charset="0"/>
         <a:buChar char="•"/>
-        <a:defRPr sz="1080" kern="1200">
+        <a:defRPr sz="3240" kern="1200">
           <a:solidFill>
             <a:schemeClr val="tx1"/>
           </a:solidFill>
@@ -2764,16 +2764,16 @@
           <a:cs typeface="+mn-cs"/>
         </a:defRPr>
       </a:lvl4pPr>
-      <a:lvl5pPr marL="1234440" indent="-137160" algn="l" defTabSz="548640" rtl="0" eaLnBrk="1" latinLnBrk="0" hangingPunct="1">
+      <a:lvl5pPr marL="3703320" indent="-411480" algn="l" defTabSz="1645920" rtl="0" eaLnBrk="1" latinLnBrk="0" hangingPunct="1">
         <a:lnSpc>
           <a:spcPct val="90000"/>
         </a:lnSpc>
         <a:spcBef>
-          <a:spcPts val="300"/>
+          <a:spcPts val="900"/>
         </a:spcBef>
         <a:buFont typeface="Arial" panose="020B0604020202020204" pitchFamily="34" charset="0"/>
         <a:buChar char="•"/>
-        <a:defRPr sz="1080" kern="1200">
+        <a:defRPr sz="3240" kern="1200">
           <a:solidFill>
             <a:schemeClr val="tx1"/>
           </a:solidFill>
@@ -2782,16 +2782,16 @@
           <a:cs typeface="+mn-cs"/>
         </a:defRPr>
       </a:lvl5pPr>
-      <a:lvl6pPr marL="1508760" indent="-137160" algn="l" defTabSz="548640" rtl="0" eaLnBrk="1" latinLnBrk="0" hangingPunct="1">
+      <a:lvl6pPr marL="4526280" indent="-411480" algn="l" defTabSz="1645920" rtl="0" eaLnBrk="1" latinLnBrk="0" hangingPunct="1">
         <a:lnSpc>
           <a:spcPct val="90000"/>
         </a:lnSpc>
         <a:spcBef>
-          <a:spcPts val="300"/>
+          <a:spcPts val="900"/>
         </a:spcBef>
         <a:buFont typeface="Arial" panose="020B0604020202020204" pitchFamily="34" charset="0"/>
         <a:buChar char="•"/>
-        <a:defRPr sz="1080" kern="1200">
+        <a:defRPr sz="3240" kern="1200">
           <a:solidFill>
             <a:schemeClr val="tx1"/>
           </a:solidFill>
@@ -2800,16 +2800,16 @@
           <a:cs typeface="+mn-cs"/>
         </a:defRPr>
       </a:lvl6pPr>
-      <a:lvl7pPr marL="1783080" indent="-137160" algn="l" defTabSz="548640" rtl="0" eaLnBrk="1" latinLnBrk="0" hangingPunct="1">
+      <a:lvl7pPr marL="5349240" indent="-411480" algn="l" defTabSz="1645920" rtl="0" eaLnBrk="1" latinLnBrk="0" hangingPunct="1">
         <a:lnSpc>
           <a:spcPct val="90000"/>
         </a:lnSpc>
         <a:spcBef>
-          <a:spcPts val="300"/>
+          <a:spcPts val="900"/>
         </a:spcBef>
         <a:buFont typeface="Arial" panose="020B0604020202020204" pitchFamily="34" charset="0"/>
         <a:buChar char="•"/>
-        <a:defRPr sz="1080" kern="1200">
+        <a:defRPr sz="3240" kern="1200">
           <a:solidFill>
             <a:schemeClr val="tx1"/>
           </a:solidFill>
@@ -2818,16 +2818,16 @@
           <a:cs typeface="+mn-cs"/>
         </a:defRPr>
       </a:lvl7pPr>
-      <a:lvl8pPr marL="2057400" indent="-137160" algn="l" defTabSz="548640" rtl="0" eaLnBrk="1" latinLnBrk="0" hangingPunct="1">
+      <a:lvl8pPr marL="6172200" indent="-411480" algn="l" defTabSz="1645920" rtl="0" eaLnBrk="1" latinLnBrk="0" hangingPunct="1">
         <a:lnSpc>
           <a:spcPct val="90000"/>
         </a:lnSpc>
         <a:spcBef>
-          <a:spcPts val="300"/>
+          <a:spcPts val="900"/>
         </a:spcBef>
         <a:buFont typeface="Arial" panose="020B0604020202020204" pitchFamily="34" charset="0"/>
         <a:buChar char="•"/>
-        <a:defRPr sz="1080" kern="1200">
+        <a:defRPr sz="3240" kern="1200">
           <a:solidFill>
             <a:schemeClr val="tx1"/>
           </a:solidFill>
@@ -2836,16 +2836,16 @@
           <a:cs typeface="+mn-cs"/>
         </a:defRPr>
       </a:lvl8pPr>
-      <a:lvl9pPr marL="2331720" indent="-137160" algn="l" defTabSz="548640" rtl="0" eaLnBrk="1" latinLnBrk="0" hangingPunct="1">
+      <a:lvl9pPr marL="6995160" indent="-411480" algn="l" defTabSz="1645920" rtl="0" eaLnBrk="1" latinLnBrk="0" hangingPunct="1">
         <a:lnSpc>
           <a:spcPct val="90000"/>
         </a:lnSpc>
         <a:spcBef>
-          <a:spcPts val="300"/>
+          <a:spcPts val="900"/>
         </a:spcBef>
         <a:buFont typeface="Arial" panose="020B0604020202020204" pitchFamily="34" charset="0"/>
         <a:buChar char="•"/>
-        <a:defRPr sz="1080" kern="1200">
+        <a:defRPr sz="3240" kern="1200">
           <a:solidFill>
             <a:schemeClr val="tx1"/>
           </a:solidFill>
@@ -2859,8 +2859,8 @@
       <a:defPPr>
         <a:defRPr lang="en-US"/>
       </a:defPPr>
-      <a:lvl1pPr marL="0" algn="l" defTabSz="548640" rtl="0" eaLnBrk="1" latinLnBrk="0" hangingPunct="1">
-        <a:defRPr sz="1080" kern="1200">
+      <a:lvl1pPr marL="0" algn="l" defTabSz="1645920" rtl="0" eaLnBrk="1" latinLnBrk="0" hangingPunct="1">
+        <a:defRPr sz="3240" kern="1200">
           <a:solidFill>
             <a:schemeClr val="tx1"/>
           </a:solidFill>
@@ -2869,8 +2869,8 @@
           <a:cs typeface="+mn-cs"/>
         </a:defRPr>
       </a:lvl1pPr>
-      <a:lvl2pPr marL="274320" algn="l" defTabSz="548640" rtl="0" eaLnBrk="1" latinLnBrk="0" hangingPunct="1">
-        <a:defRPr sz="1080" kern="1200">
+      <a:lvl2pPr marL="822960" algn="l" defTabSz="1645920" rtl="0" eaLnBrk="1" latinLnBrk="0" hangingPunct="1">
+        <a:defRPr sz="3240" kern="1200">
           <a:solidFill>
             <a:schemeClr val="tx1"/>
           </a:solidFill>
@@ -2879,8 +2879,8 @@
           <a:cs typeface="+mn-cs"/>
         </a:defRPr>
       </a:lvl2pPr>
-      <a:lvl3pPr marL="548640" algn="l" defTabSz="548640" rtl="0" eaLnBrk="1" latinLnBrk="0" hangingPunct="1">
-        <a:defRPr sz="1080" kern="1200">
+      <a:lvl3pPr marL="1645920" algn="l" defTabSz="1645920" rtl="0" eaLnBrk="1" latinLnBrk="0" hangingPunct="1">
+        <a:defRPr sz="3240" kern="1200">
           <a:solidFill>
             <a:schemeClr val="tx1"/>
           </a:solidFill>
@@ -2889,8 +2889,8 @@
           <a:cs typeface="+mn-cs"/>
         </a:defRPr>
       </a:lvl3pPr>
-      <a:lvl4pPr marL="822960" algn="l" defTabSz="548640" rtl="0" eaLnBrk="1" latinLnBrk="0" hangingPunct="1">
-        <a:defRPr sz="1080" kern="1200">
+      <a:lvl4pPr marL="2468880" algn="l" defTabSz="1645920" rtl="0" eaLnBrk="1" latinLnBrk="0" hangingPunct="1">
+        <a:defRPr sz="3240" kern="1200">
           <a:solidFill>
             <a:schemeClr val="tx1"/>
           </a:solidFill>
@@ -2899,8 +2899,8 @@
           <a:cs typeface="+mn-cs"/>
         </a:defRPr>
       </a:lvl4pPr>
-      <a:lvl5pPr marL="1097280" algn="l" defTabSz="548640" rtl="0" eaLnBrk="1" latinLnBrk="0" hangingPunct="1">
-        <a:defRPr sz="1080" kern="1200">
+      <a:lvl5pPr marL="3291840" algn="l" defTabSz="1645920" rtl="0" eaLnBrk="1" latinLnBrk="0" hangingPunct="1">
+        <a:defRPr sz="3240" kern="1200">
           <a:solidFill>
             <a:schemeClr val="tx1"/>
           </a:solidFill>
@@ -2909,8 +2909,8 @@
           <a:cs typeface="+mn-cs"/>
         </a:defRPr>
       </a:lvl5pPr>
-      <a:lvl6pPr marL="1371600" algn="l" defTabSz="548640" rtl="0" eaLnBrk="1" latinLnBrk="0" hangingPunct="1">
-        <a:defRPr sz="1080" kern="1200">
+      <a:lvl6pPr marL="4114800" algn="l" defTabSz="1645920" rtl="0" eaLnBrk="1" latinLnBrk="0" hangingPunct="1">
+        <a:defRPr sz="3240" kern="1200">
           <a:solidFill>
             <a:schemeClr val="tx1"/>
           </a:solidFill>
@@ -2919,8 +2919,8 @@
           <a:cs typeface="+mn-cs"/>
         </a:defRPr>
       </a:lvl6pPr>
-      <a:lvl7pPr marL="1645920" algn="l" defTabSz="548640" rtl="0" eaLnBrk="1" latinLnBrk="0" hangingPunct="1">
-        <a:defRPr sz="1080" kern="1200">
+      <a:lvl7pPr marL="4937760" algn="l" defTabSz="1645920" rtl="0" eaLnBrk="1" latinLnBrk="0" hangingPunct="1">
+        <a:defRPr sz="3240" kern="1200">
           <a:solidFill>
             <a:schemeClr val="tx1"/>
           </a:solidFill>
@@ -2929,8 +2929,8 @@
           <a:cs typeface="+mn-cs"/>
         </a:defRPr>
       </a:lvl7pPr>
-      <a:lvl8pPr marL="1920240" algn="l" defTabSz="548640" rtl="0" eaLnBrk="1" latinLnBrk="0" hangingPunct="1">
-        <a:defRPr sz="1080" kern="1200">
+      <a:lvl8pPr marL="5760720" algn="l" defTabSz="1645920" rtl="0" eaLnBrk="1" latinLnBrk="0" hangingPunct="1">
+        <a:defRPr sz="3240" kern="1200">
           <a:solidFill>
             <a:schemeClr val="tx1"/>
           </a:solidFill>
@@ -2939,8 +2939,8 @@
           <a:cs typeface="+mn-cs"/>
         </a:defRPr>
       </a:lvl8pPr>
-      <a:lvl9pPr marL="2194560" algn="l" defTabSz="548640" rtl="0" eaLnBrk="1" latinLnBrk="0" hangingPunct="1">
-        <a:defRPr sz="1080" kern="1200">
+      <a:lvl9pPr marL="6583680" algn="l" defTabSz="1645920" rtl="0" eaLnBrk="1" latinLnBrk="0" hangingPunct="1">
+        <a:defRPr sz="3240" kern="1200">
           <a:solidFill>
             <a:schemeClr val="tx1"/>
           </a:solidFill>
@@ -2973,10 +2973,10 @@
       </p:grpSpPr>
       <p:pic>
         <p:nvPicPr>
-          <p:cNvPr id="7" name="Picture 6">
+          <p:cNvPr id="3" name="Picture 2">
             <a:extLst>
               <a:ext uri="{FF2B5EF4-FFF2-40B4-BE49-F238E27FC236}">
-                <a16:creationId xmlns:a16="http://schemas.microsoft.com/office/drawing/2014/main" id="{E4EA2351-9902-104E-B721-769080F6B2FB}"/>
+                <a16:creationId xmlns:a16="http://schemas.microsoft.com/office/drawing/2014/main" id="{17F2C981-B038-9A01-A89B-F126EB1A3E12}"/>
               </a:ext>
             </a:extLst>
           </p:cNvPr>
@@ -2993,7 +2993,7 @@
         </p:blipFill>
         <p:spPr>
           <a:xfrm>
-            <a:off x="0" y="7315200"/>
+            <a:off x="0" y="477298"/>
             <a:ext cx="5486400" cy="3657600"/>
           </a:xfrm>
           <a:prstGeom prst="rect">
@@ -3003,10 +3003,10 @@
       </p:pic>
       <p:pic>
         <p:nvPicPr>
-          <p:cNvPr id="10" name="Picture 9">
+          <p:cNvPr id="5" name="Picture 4">
             <a:extLst>
               <a:ext uri="{FF2B5EF4-FFF2-40B4-BE49-F238E27FC236}">
-                <a16:creationId xmlns:a16="http://schemas.microsoft.com/office/drawing/2014/main" id="{64C8C099-9A83-8DE2-6E5A-50525A6A1146}"/>
+                <a16:creationId xmlns:a16="http://schemas.microsoft.com/office/drawing/2014/main" id="{C21389F2-A253-1ADC-58DF-800EF1576D1F}"/>
               </a:ext>
             </a:extLst>
           </p:cNvPr>
@@ -3023,7 +3023,7 @@
         </p:blipFill>
         <p:spPr>
           <a:xfrm>
-            <a:off x="0" y="10972800"/>
+            <a:off x="5486400" y="477298"/>
             <a:ext cx="5486400" cy="3657600"/>
           </a:xfrm>
           <a:prstGeom prst="rect">
@@ -3033,10 +3033,10 @@
       </p:pic>
       <p:pic>
         <p:nvPicPr>
-          <p:cNvPr id="3" name="Picture 2">
+          <p:cNvPr id="8" name="Picture 7">
             <a:extLst>
               <a:ext uri="{FF2B5EF4-FFF2-40B4-BE49-F238E27FC236}">
-                <a16:creationId xmlns:a16="http://schemas.microsoft.com/office/drawing/2014/main" id="{17F2C981-B038-9A01-A89B-F126EB1A3E12}"/>
+                <a16:creationId xmlns:a16="http://schemas.microsoft.com/office/drawing/2014/main" id="{2AE9A116-0331-54D2-9325-E884A1D5E305}"/>
               </a:ext>
             </a:extLst>
           </p:cNvPr>
@@ -3053,7 +3053,7 @@
         </p:blipFill>
         <p:spPr>
           <a:xfrm>
-            <a:off x="0" y="0"/>
+            <a:off x="10972800" y="477298"/>
             <a:ext cx="5486400" cy="3657600"/>
           </a:xfrm>
           <a:prstGeom prst="rect">
@@ -3061,12 +3061,224 @@
           </a:prstGeom>
         </p:spPr>
       </p:pic>
+      <p:sp>
+        <p:nvSpPr>
+          <p:cNvPr id="22" name="Rectangle 21">
+            <a:extLst>
+              <a:ext uri="{FF2B5EF4-FFF2-40B4-BE49-F238E27FC236}">
+                <a16:creationId xmlns:a16="http://schemas.microsoft.com/office/drawing/2014/main" id="{8E98A881-DC2A-9174-BCA4-9E6AFC684A95}"/>
+              </a:ext>
+            </a:extLst>
+          </p:cNvPr>
+          <p:cNvSpPr/>
+          <p:nvPr/>
+        </p:nvSpPr>
+        <p:spPr>
+          <a:xfrm>
+            <a:off x="4407825" y="2100616"/>
+            <a:ext cx="839755" cy="1362456"/>
+          </a:xfrm>
+          <a:prstGeom prst="rect">
+            <a:avLst/>
+          </a:prstGeom>
+          <a:solidFill>
+            <a:schemeClr val="bg1"/>
+          </a:solidFill>
+          <a:ln>
+            <a:noFill/>
+          </a:ln>
+        </p:spPr>
+        <p:style>
+          <a:lnRef idx="2">
+            <a:schemeClr val="accent1">
+              <a:shade val="15000"/>
+            </a:schemeClr>
+          </a:lnRef>
+          <a:fillRef idx="1">
+            <a:schemeClr val="accent1"/>
+          </a:fillRef>
+          <a:effectRef idx="0">
+            <a:schemeClr val="accent1"/>
+          </a:effectRef>
+          <a:fontRef idx="minor">
+            <a:schemeClr val="lt1"/>
+          </a:fontRef>
+        </p:style>
+        <p:txBody>
+          <a:bodyPr rtlCol="0" anchor="ctr"/>
+          <a:lstStyle/>
+          <a:p>
+            <a:pPr algn="ctr"/>
+            <a:endParaRPr lang="en-US"/>
+          </a:p>
+        </p:txBody>
+      </p:sp>
+      <p:sp>
+        <p:nvSpPr>
+          <p:cNvPr id="23" name="Rectangle 22">
+            <a:extLst>
+              <a:ext uri="{FF2B5EF4-FFF2-40B4-BE49-F238E27FC236}">
+                <a16:creationId xmlns:a16="http://schemas.microsoft.com/office/drawing/2014/main" id="{B3B21055-F6CF-DD77-D2B2-C7781CF7DA0B}"/>
+              </a:ext>
+            </a:extLst>
+          </p:cNvPr>
+          <p:cNvSpPr/>
+          <p:nvPr/>
+        </p:nvSpPr>
+        <p:spPr>
+          <a:xfrm>
+            <a:off x="9894225" y="2100616"/>
+            <a:ext cx="839755" cy="1362456"/>
+          </a:xfrm>
+          <a:prstGeom prst="rect">
+            <a:avLst/>
+          </a:prstGeom>
+          <a:solidFill>
+            <a:schemeClr val="bg1"/>
+          </a:solidFill>
+          <a:ln>
+            <a:noFill/>
+          </a:ln>
+        </p:spPr>
+        <p:style>
+          <a:lnRef idx="2">
+            <a:schemeClr val="accent1">
+              <a:shade val="15000"/>
+            </a:schemeClr>
+          </a:lnRef>
+          <a:fillRef idx="1">
+            <a:schemeClr val="accent1"/>
+          </a:fillRef>
+          <a:effectRef idx="0">
+            <a:schemeClr val="accent1"/>
+          </a:effectRef>
+          <a:fontRef idx="minor">
+            <a:schemeClr val="lt1"/>
+          </a:fontRef>
+        </p:style>
+        <p:txBody>
+          <a:bodyPr rtlCol="0" anchor="ctr"/>
+          <a:lstStyle/>
+          <a:p>
+            <a:pPr algn="ctr"/>
+            <a:endParaRPr lang="en-US"/>
+          </a:p>
+        </p:txBody>
+      </p:sp>
+      <p:sp>
+        <p:nvSpPr>
+          <p:cNvPr id="24" name="TextBox 23">
+            <a:extLst>
+              <a:ext uri="{FF2B5EF4-FFF2-40B4-BE49-F238E27FC236}">
+                <a16:creationId xmlns:a16="http://schemas.microsoft.com/office/drawing/2014/main" id="{4A09AA22-A1E4-2390-62FB-94DA0BDE7B75}"/>
+              </a:ext>
+            </a:extLst>
+          </p:cNvPr>
+          <p:cNvSpPr txBox="1"/>
+          <p:nvPr/>
+        </p:nvSpPr>
+        <p:spPr>
+          <a:xfrm>
+            <a:off x="0" y="20098"/>
+            <a:ext cx="5486400" cy="461665"/>
+          </a:xfrm>
+          <a:prstGeom prst="rect">
+            <a:avLst/>
+          </a:prstGeom>
+          <a:noFill/>
+        </p:spPr>
+        <p:txBody>
+          <a:bodyPr wrap="square" rtlCol="0">
+            <a:spAutoFit/>
+          </a:bodyPr>
+          <a:lstStyle/>
+          <a:p>
+            <a:pPr algn="ctr"/>
+            <a:r>
+              <a:rPr lang="en-US" sz="2400" b="1" dirty="0"/>
+              <a:t>Exploratory</a:t>
+            </a:r>
+          </a:p>
+        </p:txBody>
+      </p:sp>
+      <p:sp>
+        <p:nvSpPr>
+          <p:cNvPr id="25" name="TextBox 24">
+            <a:extLst>
+              <a:ext uri="{FF2B5EF4-FFF2-40B4-BE49-F238E27FC236}">
+                <a16:creationId xmlns:a16="http://schemas.microsoft.com/office/drawing/2014/main" id="{2EA5FD7A-7EEB-EC82-EEEE-6EEB6E68F21A}"/>
+              </a:ext>
+            </a:extLst>
+          </p:cNvPr>
+          <p:cNvSpPr txBox="1"/>
+          <p:nvPr/>
+        </p:nvSpPr>
+        <p:spPr>
+          <a:xfrm>
+            <a:off x="5486400" y="15633"/>
+            <a:ext cx="5486400" cy="461665"/>
+          </a:xfrm>
+          <a:prstGeom prst="rect">
+            <a:avLst/>
+          </a:prstGeom>
+          <a:noFill/>
+        </p:spPr>
+        <p:txBody>
+          <a:bodyPr wrap="square" rtlCol="0">
+            <a:spAutoFit/>
+          </a:bodyPr>
+          <a:lstStyle/>
+          <a:p>
+            <a:pPr algn="ctr"/>
+            <a:r>
+              <a:rPr lang="en-US" sz="2400" b="1" dirty="0"/>
+              <a:t>Confirmatory</a:t>
+            </a:r>
+          </a:p>
+        </p:txBody>
+      </p:sp>
+      <p:sp>
+        <p:nvSpPr>
+          <p:cNvPr id="26" name="TextBox 25">
+            <a:extLst>
+              <a:ext uri="{FF2B5EF4-FFF2-40B4-BE49-F238E27FC236}">
+                <a16:creationId xmlns:a16="http://schemas.microsoft.com/office/drawing/2014/main" id="{6ECA0EE6-BAED-A47C-DE0A-89F8D2938072}"/>
+              </a:ext>
+            </a:extLst>
+          </p:cNvPr>
+          <p:cNvSpPr txBox="1"/>
+          <p:nvPr/>
+        </p:nvSpPr>
+        <p:spPr>
+          <a:xfrm>
+            <a:off x="10972800" y="11168"/>
+            <a:ext cx="5486400" cy="461665"/>
+          </a:xfrm>
+          <a:prstGeom prst="rect">
+            <a:avLst/>
+          </a:prstGeom>
+          <a:noFill/>
+        </p:spPr>
+        <p:txBody>
+          <a:bodyPr wrap="square" rtlCol="0">
+            <a:spAutoFit/>
+          </a:bodyPr>
+          <a:lstStyle/>
+          <a:p>
+            <a:pPr algn="ctr"/>
+            <a:r>
+              <a:rPr lang="en-US" sz="2400" b="1" dirty="0"/>
+              <a:t>Joint</a:t>
+            </a:r>
+          </a:p>
+        </p:txBody>
+      </p:sp>
       <p:pic>
         <p:nvPicPr>
-          <p:cNvPr id="4" name="Picture 3">
+          <p:cNvPr id="37" name="Picture 36">
             <a:extLst>
               <a:ext uri="{FF2B5EF4-FFF2-40B4-BE49-F238E27FC236}">
-                <a16:creationId xmlns:a16="http://schemas.microsoft.com/office/drawing/2014/main" id="{888A5D06-A704-3454-4A1B-21EDA933E7B1}"/>
+                <a16:creationId xmlns:a16="http://schemas.microsoft.com/office/drawing/2014/main" id="{BB79AA41-28F6-33A7-A50B-8AFE9571369F}"/>
               </a:ext>
             </a:extLst>
           </p:cNvPr>
@@ -3083,7 +3295,247 @@
         </p:blipFill>
         <p:spPr>
           <a:xfrm>
-            <a:off x="0" y="3657600"/>
+            <a:off x="0" y="4134898"/>
+            <a:ext cx="5486400" cy="3657600"/>
+          </a:xfrm>
+          <a:prstGeom prst="rect">
+            <a:avLst/>
+          </a:prstGeom>
+        </p:spPr>
+      </p:pic>
+      <p:pic>
+        <p:nvPicPr>
+          <p:cNvPr id="39" name="Picture 38">
+            <a:extLst>
+              <a:ext uri="{FF2B5EF4-FFF2-40B4-BE49-F238E27FC236}">
+                <a16:creationId xmlns:a16="http://schemas.microsoft.com/office/drawing/2014/main" id="{5745CA2D-DC39-70B2-E09C-55ED0CE52437}"/>
+              </a:ext>
+            </a:extLst>
+          </p:cNvPr>
+          <p:cNvPicPr>
+            <a:picLocks noChangeAspect="1"/>
+          </p:cNvPicPr>
+          <p:nvPr/>
+        </p:nvPicPr>
+        <p:blipFill>
+          <a:blip r:embed="rId6"/>
+          <a:stretch>
+            <a:fillRect/>
+          </a:stretch>
+        </p:blipFill>
+        <p:spPr>
+          <a:xfrm>
+            <a:off x="5486400" y="4139363"/>
+            <a:ext cx="5486400" cy="3657600"/>
+          </a:xfrm>
+          <a:prstGeom prst="rect">
+            <a:avLst/>
+          </a:prstGeom>
+        </p:spPr>
+      </p:pic>
+      <p:pic>
+        <p:nvPicPr>
+          <p:cNvPr id="41" name="Picture 40">
+            <a:extLst>
+              <a:ext uri="{FF2B5EF4-FFF2-40B4-BE49-F238E27FC236}">
+                <a16:creationId xmlns:a16="http://schemas.microsoft.com/office/drawing/2014/main" id="{7E3163EE-3544-BF2F-319C-64F951F38162}"/>
+              </a:ext>
+            </a:extLst>
+          </p:cNvPr>
+          <p:cNvPicPr>
+            <a:picLocks noChangeAspect="1"/>
+          </p:cNvPicPr>
+          <p:nvPr/>
+        </p:nvPicPr>
+        <p:blipFill>
+          <a:blip r:embed="rId7"/>
+          <a:stretch>
+            <a:fillRect/>
+          </a:stretch>
+        </p:blipFill>
+        <p:spPr>
+          <a:xfrm>
+            <a:off x="10972800" y="4130433"/>
+            <a:ext cx="5486400" cy="3657600"/>
+          </a:xfrm>
+          <a:prstGeom prst="rect">
+            <a:avLst/>
+          </a:prstGeom>
+        </p:spPr>
+      </p:pic>
+      <p:pic>
+        <p:nvPicPr>
+          <p:cNvPr id="43" name="Picture 42">
+            <a:extLst>
+              <a:ext uri="{FF2B5EF4-FFF2-40B4-BE49-F238E27FC236}">
+                <a16:creationId xmlns:a16="http://schemas.microsoft.com/office/drawing/2014/main" id="{F675D7AA-A108-FF33-F700-8878A3D7A9E6}"/>
+              </a:ext>
+            </a:extLst>
+          </p:cNvPr>
+          <p:cNvPicPr>
+            <a:picLocks noChangeAspect="1"/>
+          </p:cNvPicPr>
+          <p:nvPr/>
+        </p:nvPicPr>
+        <p:blipFill>
+          <a:blip r:embed="rId8"/>
+          <a:stretch>
+            <a:fillRect/>
+          </a:stretch>
+        </p:blipFill>
+        <p:spPr>
+          <a:xfrm>
+            <a:off x="0" y="7808125"/>
+            <a:ext cx="5486400" cy="3657600"/>
+          </a:xfrm>
+          <a:prstGeom prst="rect">
+            <a:avLst/>
+          </a:prstGeom>
+        </p:spPr>
+      </p:pic>
+      <p:pic>
+        <p:nvPicPr>
+          <p:cNvPr id="45" name="Picture 44">
+            <a:extLst>
+              <a:ext uri="{FF2B5EF4-FFF2-40B4-BE49-F238E27FC236}">
+                <a16:creationId xmlns:a16="http://schemas.microsoft.com/office/drawing/2014/main" id="{D761B2C9-1F59-12A0-E778-C87AA4B556EF}"/>
+              </a:ext>
+            </a:extLst>
+          </p:cNvPr>
+          <p:cNvPicPr>
+            <a:picLocks noChangeAspect="1"/>
+          </p:cNvPicPr>
+          <p:nvPr/>
+        </p:nvPicPr>
+        <p:blipFill>
+          <a:blip r:embed="rId9"/>
+          <a:stretch>
+            <a:fillRect/>
+          </a:stretch>
+        </p:blipFill>
+        <p:spPr>
+          <a:xfrm>
+            <a:off x="5486400" y="7781336"/>
+            <a:ext cx="5486400" cy="3657600"/>
+          </a:xfrm>
+          <a:prstGeom prst="rect">
+            <a:avLst/>
+          </a:prstGeom>
+        </p:spPr>
+      </p:pic>
+      <p:pic>
+        <p:nvPicPr>
+          <p:cNvPr id="47" name="Picture 46">
+            <a:extLst>
+              <a:ext uri="{FF2B5EF4-FFF2-40B4-BE49-F238E27FC236}">
+                <a16:creationId xmlns:a16="http://schemas.microsoft.com/office/drawing/2014/main" id="{A1872337-D4FE-C28A-46B0-7C1CD5915144}"/>
+              </a:ext>
+            </a:extLst>
+          </p:cNvPr>
+          <p:cNvPicPr>
+            <a:picLocks noChangeAspect="1"/>
+          </p:cNvPicPr>
+          <p:nvPr/>
+        </p:nvPicPr>
+        <p:blipFill>
+          <a:blip r:embed="rId10"/>
+          <a:stretch>
+            <a:fillRect/>
+          </a:stretch>
+        </p:blipFill>
+        <p:spPr>
+          <a:xfrm>
+            <a:off x="10972800" y="7783568"/>
+            <a:ext cx="5486400" cy="3657600"/>
+          </a:xfrm>
+          <a:prstGeom prst="rect">
+            <a:avLst/>
+          </a:prstGeom>
+        </p:spPr>
+      </p:pic>
+      <p:pic>
+        <p:nvPicPr>
+          <p:cNvPr id="49" name="Picture 48">
+            <a:extLst>
+              <a:ext uri="{FF2B5EF4-FFF2-40B4-BE49-F238E27FC236}">
+                <a16:creationId xmlns:a16="http://schemas.microsoft.com/office/drawing/2014/main" id="{00A255E0-CF4F-1151-A42A-B5FE5852C594}"/>
+              </a:ext>
+            </a:extLst>
+          </p:cNvPr>
+          <p:cNvPicPr>
+            <a:picLocks noChangeAspect="1"/>
+          </p:cNvPicPr>
+          <p:nvPr/>
+        </p:nvPicPr>
+        <p:blipFill>
+          <a:blip r:embed="rId11"/>
+          <a:stretch>
+            <a:fillRect/>
+          </a:stretch>
+        </p:blipFill>
+        <p:spPr>
+          <a:xfrm>
+            <a:off x="0" y="11430000"/>
+            <a:ext cx="5486400" cy="3657600"/>
+          </a:xfrm>
+          <a:prstGeom prst="rect">
+            <a:avLst/>
+          </a:prstGeom>
+        </p:spPr>
+      </p:pic>
+      <p:pic>
+        <p:nvPicPr>
+          <p:cNvPr id="51" name="Picture 50">
+            <a:extLst>
+              <a:ext uri="{FF2B5EF4-FFF2-40B4-BE49-F238E27FC236}">
+                <a16:creationId xmlns:a16="http://schemas.microsoft.com/office/drawing/2014/main" id="{4A8DD5EE-9B57-E6C6-80A2-0A1236949E78}"/>
+              </a:ext>
+            </a:extLst>
+          </p:cNvPr>
+          <p:cNvPicPr>
+            <a:picLocks noChangeAspect="1"/>
+          </p:cNvPicPr>
+          <p:nvPr/>
+        </p:nvPicPr>
+        <p:blipFill>
+          <a:blip r:embed="rId12"/>
+          <a:stretch>
+            <a:fillRect/>
+          </a:stretch>
+        </p:blipFill>
+        <p:spPr>
+          <a:xfrm>
+            <a:off x="5486400" y="11430000"/>
+            <a:ext cx="5486400" cy="3657600"/>
+          </a:xfrm>
+          <a:prstGeom prst="rect">
+            <a:avLst/>
+          </a:prstGeom>
+        </p:spPr>
+      </p:pic>
+      <p:pic>
+        <p:nvPicPr>
+          <p:cNvPr id="53" name="Picture 52">
+            <a:extLst>
+              <a:ext uri="{FF2B5EF4-FFF2-40B4-BE49-F238E27FC236}">
+                <a16:creationId xmlns:a16="http://schemas.microsoft.com/office/drawing/2014/main" id="{BA47F6D2-134C-A51C-90F5-1112DF756BF3}"/>
+              </a:ext>
+            </a:extLst>
+          </p:cNvPr>
+          <p:cNvPicPr>
+            <a:picLocks noChangeAspect="1"/>
+          </p:cNvPicPr>
+          <p:nvPr/>
+        </p:nvPicPr>
+        <p:blipFill>
+          <a:blip r:embed="rId13"/>
+          <a:stretch>
+            <a:fillRect/>
+          </a:stretch>
+        </p:blipFill>
+        <p:spPr>
+          <a:xfrm>
+            <a:off x="10972800" y="11430000"/>
             <a:ext cx="5486400" cy="3657600"/>
           </a:xfrm>
           <a:prstGeom prst="rect">

</xml_diff>